<commit_message>
change onomotopoeiac names to letters in workflow figure
</commit_message>
<xml_diff>
--- a/Tutorials_Figures.pptx
+++ b/Tutorials_Figures.pptx
@@ -5,10 +5,9 @@
     <p:sldMasterId id="2147483672" r:id="rId1"/>
   </p:sldMasterIdLst>
   <p:sldIdLst>
-    <p:sldId id="256" r:id="rId2"/>
-    <p:sldId id="257" r:id="rId3"/>
-    <p:sldId id="258" r:id="rId4"/>
-    <p:sldId id="259" r:id="rId5"/>
+    <p:sldId id="257" r:id="rId2"/>
+    <p:sldId id="258" r:id="rId3"/>
+    <p:sldId id="259" r:id="rId4"/>
   </p:sldIdLst>
   <p:sldSz cx="6858000" cy="9144000" type="letter"/>
   <p:notesSz cx="6858000" cy="9144000"/>
@@ -2976,16 +2975,68 @@
       </p:grpSpPr>
       <p:sp>
         <p:nvSpPr>
-          <p:cNvPr id="30" name="Explosion 2 29"/>
+          <p:cNvPr id="33" name="TextBox 32"/>
+          <p:cNvSpPr txBox="1"/>
+          <p:nvPr/>
+        </p:nvSpPr>
+        <p:spPr>
+          <a:xfrm rot="1617114">
+            <a:off x="1628962" y="702573"/>
+            <a:ext cx="1337978" cy="617733"/>
+          </a:xfrm>
+          <a:prstGeom prst="rect">
+            <a:avLst/>
+          </a:prstGeom>
+          <a:noFill/>
+        </p:spPr>
+        <p:txBody>
+          <a:bodyPr wrap="square" rtlCol="0">
+            <a:spAutoFit/>
+          </a:bodyPr>
+          <a:lstStyle/>
+          <a:p>
+            <a:pPr algn="ctr">
+              <a:lnSpc>
+                <a:spcPct val="150000"/>
+              </a:lnSpc>
+            </a:pPr>
+            <a:r>
+              <a:rPr lang="en-US" sz="1200" dirty="0" smtClean="0">
+                <a:latin typeface="+mj-lt"/>
+              </a:rPr>
+              <a:t>A output</a:t>
+            </a:r>
+          </a:p>
+          <a:p>
+            <a:pPr algn="ctr">
+              <a:lnSpc>
+                <a:spcPct val="150000"/>
+              </a:lnSpc>
+            </a:pPr>
+            <a:r>
+              <a:rPr lang="en-US" sz="1200" dirty="0" smtClean="0">
+                <a:latin typeface="+mj-lt"/>
+              </a:rPr>
+              <a:t>used in B</a:t>
+            </a:r>
+            <a:endParaRPr lang="en-US" sz="1200" dirty="0">
+              <a:latin typeface="+mj-lt"/>
+            </a:endParaRPr>
+          </a:p>
+        </p:txBody>
+      </p:sp>
+      <p:sp>
+        <p:nvSpPr>
+          <p:cNvPr id="60" name="Rounded Rectangle 59"/>
           <p:cNvSpPr/>
           <p:nvPr/>
         </p:nvSpPr>
         <p:spPr>
           <a:xfrm>
-            <a:off x="183639" y="0"/>
-            <a:ext cx="3051607" cy="2694506"/>
-          </a:xfrm>
-          <a:prstGeom prst="irregularSeal2">
+            <a:off x="4415094" y="5200667"/>
+            <a:ext cx="1879426" cy="1357653"/>
+          </a:xfrm>
+          <a:prstGeom prst="roundRect">
             <a:avLst/>
           </a:prstGeom>
         </p:spPr>
@@ -3008,27 +3059,22 @@
           <a:lstStyle/>
           <a:p>
             <a:pPr algn="ctr"/>
-            <a:endParaRPr lang="en-US" sz="1200" dirty="0">
-              <a:solidFill>
-                <a:schemeClr val="tx1"/>
-              </a:solidFill>
-              <a:latin typeface="Comic Sans MS" panose="030F0702030302020204" pitchFamily="66" charset="0"/>
-            </a:endParaRPr>
-          </a:p>
-        </p:txBody>
-      </p:sp>
-      <p:sp>
-        <p:nvSpPr>
-          <p:cNvPr id="31" name="Explosion 2 30"/>
+            <a:endParaRPr lang="en-US"/>
+          </a:p>
+        </p:txBody>
+      </p:sp>
+      <p:sp>
+        <p:nvSpPr>
+          <p:cNvPr id="2" name="Rounded Rectangle 1"/>
           <p:cNvSpPr/>
           <p:nvPr/>
         </p:nvSpPr>
         <p:spPr>
           <a:xfrm>
-            <a:off x="3799179" y="64925"/>
-            <a:ext cx="3051607" cy="2694506"/>
-          </a:xfrm>
-          <a:prstGeom prst="irregularSeal2">
+            <a:off x="-142799" y="260360"/>
+            <a:ext cx="1879426" cy="1068536"/>
+          </a:xfrm>
+          <a:prstGeom prst="roundRect">
             <a:avLst/>
           </a:prstGeom>
         </p:spPr>
@@ -3051,12 +3097,197 @@
           <a:lstStyle/>
           <a:p>
             <a:pPr algn="ctr"/>
-            <a:endParaRPr lang="en-US" sz="1200" dirty="0">
-              <a:solidFill>
-                <a:schemeClr val="tx1"/>
-              </a:solidFill>
-              <a:latin typeface="Comic Sans MS" panose="030F0702030302020204" pitchFamily="66" charset="0"/>
-            </a:endParaRPr>
+            <a:endParaRPr lang="en-US"/>
+          </a:p>
+        </p:txBody>
+      </p:sp>
+      <p:sp>
+        <p:nvSpPr>
+          <p:cNvPr id="47" name="Rounded Rectangle 46"/>
+          <p:cNvSpPr/>
+          <p:nvPr/>
+        </p:nvSpPr>
+        <p:spPr>
+          <a:xfrm>
+            <a:off x="2726853" y="898414"/>
+            <a:ext cx="1879426" cy="1068536"/>
+          </a:xfrm>
+          <a:prstGeom prst="roundRect">
+            <a:avLst/>
+          </a:prstGeom>
+        </p:spPr>
+        <p:style>
+          <a:lnRef idx="1">
+            <a:schemeClr val="accent3"/>
+          </a:lnRef>
+          <a:fillRef idx="2">
+            <a:schemeClr val="accent3"/>
+          </a:fillRef>
+          <a:effectRef idx="1">
+            <a:schemeClr val="accent3"/>
+          </a:effectRef>
+          <a:fontRef idx="minor">
+            <a:schemeClr val="dk1"/>
+          </a:fontRef>
+        </p:style>
+        <p:txBody>
+          <a:bodyPr rtlCol="0" anchor="ctr"/>
+          <a:lstStyle/>
+          <a:p>
+            <a:pPr algn="ctr"/>
+            <a:endParaRPr lang="en-US"/>
+          </a:p>
+        </p:txBody>
+      </p:sp>
+      <p:sp>
+        <p:nvSpPr>
+          <p:cNvPr id="56" name="Rounded Rectangle 55"/>
+          <p:cNvSpPr/>
+          <p:nvPr/>
+        </p:nvSpPr>
+        <p:spPr>
+          <a:xfrm>
+            <a:off x="521353" y="2694781"/>
+            <a:ext cx="1879426" cy="1214741"/>
+          </a:xfrm>
+          <a:prstGeom prst="roundRect">
+            <a:avLst/>
+          </a:prstGeom>
+        </p:spPr>
+        <p:style>
+          <a:lnRef idx="1">
+            <a:schemeClr val="accent3"/>
+          </a:lnRef>
+          <a:fillRef idx="2">
+            <a:schemeClr val="accent3"/>
+          </a:fillRef>
+          <a:effectRef idx="1">
+            <a:schemeClr val="accent3"/>
+          </a:effectRef>
+          <a:fontRef idx="minor">
+            <a:schemeClr val="dk1"/>
+          </a:fontRef>
+        </p:style>
+        <p:txBody>
+          <a:bodyPr rtlCol="0" anchor="ctr"/>
+          <a:lstStyle/>
+          <a:p>
+            <a:pPr algn="ctr"/>
+            <a:endParaRPr lang="en-US"/>
+          </a:p>
+        </p:txBody>
+      </p:sp>
+      <p:sp>
+        <p:nvSpPr>
+          <p:cNvPr id="57" name="Rounded Rectangle 56"/>
+          <p:cNvSpPr/>
+          <p:nvPr/>
+        </p:nvSpPr>
+        <p:spPr>
+          <a:xfrm>
+            <a:off x="4978574" y="1494148"/>
+            <a:ext cx="1879426" cy="1357653"/>
+          </a:xfrm>
+          <a:prstGeom prst="roundRect">
+            <a:avLst/>
+          </a:prstGeom>
+        </p:spPr>
+        <p:style>
+          <a:lnRef idx="1">
+            <a:schemeClr val="accent3"/>
+          </a:lnRef>
+          <a:fillRef idx="2">
+            <a:schemeClr val="accent3"/>
+          </a:fillRef>
+          <a:effectRef idx="1">
+            <a:schemeClr val="accent3"/>
+          </a:effectRef>
+          <a:fontRef idx="minor">
+            <a:schemeClr val="dk1"/>
+          </a:fontRef>
+        </p:style>
+        <p:txBody>
+          <a:bodyPr rtlCol="0" anchor="ctr"/>
+          <a:lstStyle/>
+          <a:p>
+            <a:pPr algn="ctr"/>
+            <a:endParaRPr lang="en-US"/>
+          </a:p>
+        </p:txBody>
+      </p:sp>
+      <p:sp>
+        <p:nvSpPr>
+          <p:cNvPr id="58" name="Rounded Rectangle 57"/>
+          <p:cNvSpPr/>
+          <p:nvPr/>
+        </p:nvSpPr>
+        <p:spPr>
+          <a:xfrm>
+            <a:off x="2539977" y="3982292"/>
+            <a:ext cx="1879426" cy="730434"/>
+          </a:xfrm>
+          <a:prstGeom prst="roundRect">
+            <a:avLst/>
+          </a:prstGeom>
+        </p:spPr>
+        <p:style>
+          <a:lnRef idx="1">
+            <a:schemeClr val="accent3"/>
+          </a:lnRef>
+          <a:fillRef idx="2">
+            <a:schemeClr val="accent3"/>
+          </a:fillRef>
+          <a:effectRef idx="1">
+            <a:schemeClr val="accent3"/>
+          </a:effectRef>
+          <a:fontRef idx="minor">
+            <a:schemeClr val="dk1"/>
+          </a:fontRef>
+        </p:style>
+        <p:txBody>
+          <a:bodyPr rtlCol="0" anchor="ctr"/>
+          <a:lstStyle/>
+          <a:p>
+            <a:pPr algn="ctr"/>
+            <a:endParaRPr lang="en-US"/>
+          </a:p>
+        </p:txBody>
+      </p:sp>
+      <p:sp>
+        <p:nvSpPr>
+          <p:cNvPr id="59" name="Rounded Rectangle 58"/>
+          <p:cNvSpPr/>
+          <p:nvPr/>
+        </p:nvSpPr>
+        <p:spPr>
+          <a:xfrm>
+            <a:off x="576847" y="5378842"/>
+            <a:ext cx="1879426" cy="1109638"/>
+          </a:xfrm>
+          <a:prstGeom prst="roundRect">
+            <a:avLst/>
+          </a:prstGeom>
+        </p:spPr>
+        <p:style>
+          <a:lnRef idx="1">
+            <a:schemeClr val="accent3"/>
+          </a:lnRef>
+          <a:fillRef idx="2">
+            <a:schemeClr val="accent3"/>
+          </a:fillRef>
+          <a:effectRef idx="1">
+            <a:schemeClr val="accent3"/>
+          </a:effectRef>
+          <a:fontRef idx="minor">
+            <a:schemeClr val="dk1"/>
+          </a:fontRef>
+        </p:style>
+        <p:txBody>
+          <a:bodyPr rtlCol="0" anchor="ctr"/>
+          <a:lstStyle/>
+          <a:p>
+            <a:pPr algn="ctr"/>
+            <a:endParaRPr lang="en-US"/>
           </a:p>
         </p:txBody>
       </p:sp>
@@ -3067,9 +3298,9 @@
           <p:nvPr/>
         </p:nvCxnSpPr>
         <p:spPr>
-          <a:xfrm flipV="1">
-            <a:off x="2840592" y="1504161"/>
-            <a:ext cx="1125415" cy="21643"/>
+          <a:xfrm>
+            <a:off x="1803486" y="794628"/>
+            <a:ext cx="854902" cy="446958"/>
           </a:xfrm>
           <a:prstGeom prst="straightConnector1">
             <a:avLst/>
@@ -3095,14 +3326,14 @@
       </p:cxnSp>
       <p:sp>
         <p:nvSpPr>
-          <p:cNvPr id="33" name="TextBox 32"/>
+          <p:cNvPr id="34" name="TextBox 33"/>
           <p:cNvSpPr txBox="1"/>
           <p:nvPr/>
         </p:nvSpPr>
         <p:spPr>
           <a:xfrm>
-            <a:off x="2657178" y="1187084"/>
-            <a:ext cx="1337978" cy="617733"/>
+            <a:off x="-75940" y="999773"/>
+            <a:ext cx="1848519" cy="276999"/>
           </a:xfrm>
           <a:prstGeom prst="rect">
             <a:avLst/>
@@ -3110,34 +3341,16 @@
           <a:noFill/>
         </p:spPr>
         <p:txBody>
-          <a:bodyPr wrap="square" rtlCol="0">
+          <a:bodyPr wrap="none" rtlCol="0">
             <a:spAutoFit/>
           </a:bodyPr>
           <a:lstStyle/>
           <a:p>
-            <a:pPr algn="ctr">
-              <a:lnSpc>
-                <a:spcPct val="150000"/>
-              </a:lnSpc>
-            </a:pPr>
             <a:r>
               <a:rPr lang="en-US" sz="1200" dirty="0" smtClean="0">
                 <a:latin typeface="+mj-lt"/>
               </a:rPr>
-              <a:t>A output</a:t>
-            </a:r>
-          </a:p>
-          <a:p>
-            <a:pPr algn="ctr">
-              <a:lnSpc>
-                <a:spcPct val="150000"/>
-              </a:lnSpc>
-            </a:pPr>
-            <a:r>
-              <a:rPr lang="en-US" sz="1200" dirty="0" smtClean="0">
-                <a:latin typeface="+mj-lt"/>
-              </a:rPr>
-              <a:t>used in B</a:t>
+              <a:t>Output: long format tables</a:t>
             </a:r>
             <a:endParaRPr lang="en-US" sz="1200" dirty="0">
               <a:latin typeface="+mj-lt"/>
@@ -3147,14 +3360,60 @@
       </p:sp>
       <p:sp>
         <p:nvSpPr>
-          <p:cNvPr id="34" name="TextBox 33"/>
+          <p:cNvPr id="35" name="Rectangle 34"/>
+          <p:cNvSpPr/>
+          <p:nvPr/>
+        </p:nvSpPr>
+        <p:spPr>
+          <a:xfrm>
+            <a:off x="-128786" y="260360"/>
+            <a:ext cx="1865413" cy="738664"/>
+          </a:xfrm>
+          <a:prstGeom prst="rect">
+            <a:avLst/>
+          </a:prstGeom>
+        </p:spPr>
+        <p:txBody>
+          <a:bodyPr wrap="square">
+            <a:spAutoFit/>
+          </a:bodyPr>
+          <a:lstStyle/>
+          <a:p>
+            <a:pPr algn="ctr"/>
+            <a:r>
+              <a:rPr lang="en-US" dirty="0" smtClean="0">
+                <a:solidFill>
+                  <a:schemeClr val="tx1"/>
+                </a:solidFill>
+                <a:latin typeface="Comic Sans MS" panose="030F0702030302020204" pitchFamily="66" charset="0"/>
+              </a:rPr>
+              <a:t>A: </a:t>
+            </a:r>
+            <a:r>
+              <a:rPr lang="en-US" sz="1200" dirty="0" smtClean="0">
+                <a:latin typeface="Comic Sans MS" panose="030F0702030302020204" pitchFamily="66" charset="0"/>
+              </a:rPr>
+              <a:t>Data </a:t>
+            </a:r>
+            <a:r>
+              <a:rPr lang="en-US" sz="1200" dirty="0">
+                <a:latin typeface="Comic Sans MS" panose="030F0702030302020204" pitchFamily="66" charset="0"/>
+              </a:rPr>
+              <a:t>acquisition, quality-checking, and clean up</a:t>
+            </a:r>
+          </a:p>
+        </p:txBody>
+      </p:sp>
+      <p:sp>
+        <p:nvSpPr>
+          <p:cNvPr id="36" name="TextBox 35"/>
           <p:cNvSpPr txBox="1"/>
           <p:nvPr/>
         </p:nvSpPr>
         <p:spPr>
           <a:xfrm>
-            <a:off x="579616" y="1547847"/>
-            <a:ext cx="1848519" cy="276999"/>
+            <a:off x="2856825" y="1635895"/>
+            <a:ext cx="1663654" cy="276999"/>
           </a:xfrm>
           <a:prstGeom prst="rect">
             <a:avLst/>
@@ -3162,16 +3421,17 @@
           <a:noFill/>
         </p:spPr>
         <p:txBody>
-          <a:bodyPr wrap="none" rtlCol="0">
+          <a:bodyPr wrap="square" rtlCol="0">
             <a:spAutoFit/>
           </a:bodyPr>
           <a:lstStyle/>
           <a:p>
+            <a:pPr algn="ctr"/>
             <a:r>
               <a:rPr lang="en-US" sz="1200" dirty="0" smtClean="0">
                 <a:latin typeface="+mj-lt"/>
               </a:rPr>
-              <a:t>Output: long format tables</a:t>
+              <a:t>Output: offset per PKEY</a:t>
             </a:r>
             <a:endParaRPr lang="en-US" sz="1200" dirty="0">
               <a:latin typeface="+mj-lt"/>
@@ -3181,14 +3441,14 @@
       </p:sp>
       <p:sp>
         <p:nvSpPr>
-          <p:cNvPr id="35" name="Rectangle 34"/>
+          <p:cNvPr id="37" name="Rectangle 36"/>
           <p:cNvSpPr/>
           <p:nvPr/>
         </p:nvSpPr>
         <p:spPr>
           <a:xfrm>
-            <a:off x="579616" y="785061"/>
-            <a:ext cx="2077562" cy="738664"/>
+            <a:off x="2812653" y="895854"/>
+            <a:ext cx="1707826" cy="738664"/>
           </a:xfrm>
           <a:prstGeom prst="rect">
             <a:avLst/>
@@ -3208,30 +3468,33 @@
                 </a:solidFill>
                 <a:latin typeface="Comic Sans MS" panose="030F0702030302020204" pitchFamily="66" charset="0"/>
               </a:rPr>
-              <a:t>Aargh</a:t>
-            </a:r>
-          </a:p>
-          <a:p>
-            <a:pPr algn="ctr"/>
+              <a:t>B: </a:t>
+            </a:r>
+            <a:r>
+              <a:rPr lang="en-US" sz="1200" dirty="0" smtClean="0">
+                <a:latin typeface="Comic Sans MS" panose="030F0702030302020204" pitchFamily="66" charset="0"/>
+              </a:rPr>
+              <a:t>Estimate </a:t>
+            </a:r>
             <a:r>
               <a:rPr lang="en-US" sz="1200" dirty="0">
                 <a:latin typeface="Comic Sans MS" panose="030F0702030302020204" pitchFamily="66" charset="0"/>
               </a:rPr>
-              <a:t>Data acquisition, quality-checking, and clean up</a:t>
-            </a:r>
-          </a:p>
-        </p:txBody>
-      </p:sp>
-      <p:sp>
-        <p:nvSpPr>
-          <p:cNvPr id="36" name="TextBox 35"/>
+              <a:t>detectability (QPAD) offsets</a:t>
+            </a:r>
+          </a:p>
+        </p:txBody>
+      </p:sp>
+      <p:sp>
+        <p:nvSpPr>
+          <p:cNvPr id="39" name="TextBox 38"/>
           <p:cNvSpPr txBox="1"/>
           <p:nvPr/>
         </p:nvSpPr>
         <p:spPr>
           <a:xfrm>
-            <a:off x="4293472" y="1686346"/>
-            <a:ext cx="1663654" cy="276999"/>
+            <a:off x="655695" y="3447857"/>
+            <a:ext cx="1663654" cy="461665"/>
           </a:xfrm>
           <a:prstGeom prst="rect">
             <a:avLst/>
@@ -3249,7 +3512,7 @@
               <a:rPr lang="en-US" sz="1200" dirty="0" smtClean="0">
                 <a:latin typeface="+mj-lt"/>
               </a:rPr>
-              <a:t>Output: offset per PKEY</a:t>
+              <a:t>Output: wide formatted table(s)</a:t>
             </a:r>
             <a:endParaRPr lang="en-US" sz="1200" dirty="0">
               <a:latin typeface="+mj-lt"/>
@@ -3259,14 +3522,14 @@
       </p:sp>
       <p:sp>
         <p:nvSpPr>
-          <p:cNvPr id="37" name="Rectangle 36"/>
+          <p:cNvPr id="40" name="Rectangle 39"/>
           <p:cNvSpPr/>
           <p:nvPr/>
         </p:nvSpPr>
         <p:spPr>
           <a:xfrm>
-            <a:off x="4492782" y="752595"/>
-            <a:ext cx="1707826" cy="923330"/>
+            <a:off x="576847" y="2748010"/>
+            <a:ext cx="1821350" cy="738664"/>
           </a:xfrm>
           <a:prstGeom prst="rect">
             <a:avLst/>
@@ -3280,149 +3543,25 @@
           <a:p>
             <a:pPr algn="ctr"/>
             <a:r>
-              <a:rPr lang="en-US" dirty="0" err="1" smtClean="0">
+              <a:rPr lang="en-US" dirty="0" smtClean="0">
                 <a:solidFill>
                   <a:schemeClr val="tx1"/>
                 </a:solidFill>
                 <a:latin typeface="Comic Sans MS" panose="030F0702030302020204" pitchFamily="66" charset="0"/>
               </a:rPr>
-              <a:t>Boink</a:t>
-            </a:r>
-            <a:endParaRPr lang="en-US" dirty="0" smtClean="0">
-              <a:solidFill>
-                <a:schemeClr val="tx1"/>
-              </a:solidFill>
-              <a:latin typeface="Comic Sans MS" panose="030F0702030302020204" pitchFamily="66" charset="0"/>
-            </a:endParaRPr>
-          </a:p>
-          <a:p>
-            <a:pPr algn="ctr"/>
-            <a:r>
-              <a:rPr lang="en-US" sz="1200" dirty="0">
-                <a:latin typeface="Comic Sans MS" panose="030F0702030302020204" pitchFamily="66" charset="0"/>
-              </a:rPr>
-              <a:t>Estimate detectability (QPAD) offsets</a:t>
-            </a:r>
-          </a:p>
-        </p:txBody>
-      </p:sp>
-      <p:sp>
-        <p:nvSpPr>
-          <p:cNvPr id="38" name="Explosion 2 37"/>
-          <p:cNvSpPr/>
-          <p:nvPr/>
-        </p:nvSpPr>
-        <p:spPr>
-          <a:xfrm>
-            <a:off x="1549250" y="2661438"/>
-            <a:ext cx="3051607" cy="2694506"/>
-          </a:xfrm>
-          <a:prstGeom prst="irregularSeal2">
-            <a:avLst/>
-          </a:prstGeom>
-        </p:spPr>
-        <p:style>
-          <a:lnRef idx="1">
-            <a:schemeClr val="accent3"/>
-          </a:lnRef>
-          <a:fillRef idx="2">
-            <a:schemeClr val="accent3"/>
-          </a:fillRef>
-          <a:effectRef idx="1">
-            <a:schemeClr val="accent3"/>
-          </a:effectRef>
-          <a:fontRef idx="minor">
-            <a:schemeClr val="dk1"/>
-          </a:fontRef>
-        </p:style>
-        <p:txBody>
-          <a:bodyPr rtlCol="0" anchor="ctr"/>
-          <a:lstStyle/>
-          <a:p>
-            <a:pPr algn="ctr"/>
-            <a:endParaRPr lang="en-US" sz="1200" dirty="0">
-              <a:solidFill>
-                <a:schemeClr val="tx1"/>
-              </a:solidFill>
-              <a:latin typeface="Comic Sans MS" panose="030F0702030302020204" pitchFamily="66" charset="0"/>
-            </a:endParaRPr>
-          </a:p>
-        </p:txBody>
-      </p:sp>
-      <p:sp>
-        <p:nvSpPr>
-          <p:cNvPr id="39" name="TextBox 38"/>
-          <p:cNvSpPr txBox="1"/>
-          <p:nvPr/>
-        </p:nvSpPr>
-        <p:spPr>
-          <a:xfrm>
-            <a:off x="2043543" y="4282859"/>
-            <a:ext cx="1663654" cy="461665"/>
-          </a:xfrm>
-          <a:prstGeom prst="rect">
-            <a:avLst/>
-          </a:prstGeom>
-          <a:noFill/>
-        </p:spPr>
-        <p:txBody>
-          <a:bodyPr wrap="square" rtlCol="0">
-            <a:spAutoFit/>
-          </a:bodyPr>
-          <a:lstStyle/>
-          <a:p>
-            <a:pPr algn="ctr"/>
-            <a:r>
-              <a:rPr lang="en-US" sz="1200" dirty="0" smtClean="0">
-                <a:latin typeface="+mj-lt"/>
-              </a:rPr>
-              <a:t>Output: wide formatted table(s)</a:t>
-            </a:r>
-            <a:endParaRPr lang="en-US" sz="1200" dirty="0">
-              <a:latin typeface="+mj-lt"/>
-            </a:endParaRPr>
-          </a:p>
-        </p:txBody>
-      </p:sp>
-      <p:sp>
-        <p:nvSpPr>
-          <p:cNvPr id="40" name="Rectangle 39"/>
-          <p:cNvSpPr/>
-          <p:nvPr/>
-        </p:nvSpPr>
-        <p:spPr>
-          <a:xfrm>
-            <a:off x="2242853" y="3349108"/>
-            <a:ext cx="1707826" cy="923330"/>
-          </a:xfrm>
-          <a:prstGeom prst="rect">
-            <a:avLst/>
-          </a:prstGeom>
-        </p:spPr>
-        <p:txBody>
-          <a:bodyPr wrap="square">
-            <a:spAutoFit/>
-          </a:bodyPr>
-          <a:lstStyle/>
-          <a:p>
-            <a:pPr algn="ctr"/>
-            <a:r>
-              <a:rPr lang="en-US" dirty="0" smtClean="0">
-                <a:solidFill>
-                  <a:schemeClr val="tx1"/>
-                </a:solidFill>
-                <a:latin typeface="Comic Sans MS" panose="030F0702030302020204" pitchFamily="66" charset="0"/>
-              </a:rPr>
-              <a:t>Clang</a:t>
-            </a:r>
-          </a:p>
-          <a:p>
-            <a:pPr algn="ctr"/>
+              <a:t>C: </a:t>
+            </a:r>
             <a:r>
               <a:rPr lang="en-US" sz="1200" dirty="0" smtClean="0">
                 <a:latin typeface="Comic Sans MS" panose="030F0702030302020204" pitchFamily="66" charset="0"/>
               </a:rPr>
-              <a:t>Create all-inclusive data package for downstream analyses</a:t>
+              <a:t>Create all-inclusive </a:t>
+            </a:r>
+            <a:r>
+              <a:rPr lang="en-US" sz="1200" dirty="0" smtClean="0">
+                <a:latin typeface="Comic Sans MS" panose="030F0702030302020204" pitchFamily="66" charset="0"/>
+              </a:rPr>
+              <a:t>data package for downstream analyses</a:t>
             </a:r>
             <a:endParaRPr lang="en-US" sz="1200" dirty="0">
               <a:latin typeface="Comic Sans MS" panose="030F0702030302020204" pitchFamily="66" charset="0"/>
@@ -3438,8 +3577,8 @@
         </p:nvCxnSpPr>
         <p:spPr>
           <a:xfrm>
-            <a:off x="2029160" y="2165448"/>
-            <a:ext cx="730272" cy="737390"/>
+            <a:off x="803920" y="1494148"/>
+            <a:ext cx="259659" cy="1062937"/>
           </a:xfrm>
           <a:prstGeom prst="straightConnector1">
             <a:avLst/>
@@ -3471,8 +3610,8 @@
         </p:nvCxnSpPr>
         <p:spPr>
           <a:xfrm flipH="1">
-            <a:off x="3235246" y="2019715"/>
-            <a:ext cx="844385" cy="912858"/>
+            <a:off x="1875987" y="2019715"/>
+            <a:ext cx="642865" cy="590599"/>
           </a:xfrm>
           <a:prstGeom prst="straightConnector1">
             <a:avLst/>
@@ -3504,7 +3643,7 @@
         </p:nvSpPr>
         <p:spPr>
           <a:xfrm>
-            <a:off x="2428135" y="2308786"/>
+            <a:off x="1048092" y="1830926"/>
             <a:ext cx="1162498" cy="461665"/>
           </a:xfrm>
           <a:prstGeom prst="rect">
@@ -3540,137 +3679,108 @@
           </a:p>
         </p:txBody>
       </p:sp>
-    </p:spTree>
-    <p:extLst>
-      <p:ext uri="{BB962C8B-B14F-4D97-AF65-F5344CB8AC3E}">
-        <p14:creationId xmlns:p14="http://schemas.microsoft.com/office/powerpoint/2010/main" val="2607321623"/>
-      </p:ext>
-    </p:extLst>
-  </p:cSld>
-  <p:clrMapOvr>
-    <a:masterClrMapping/>
-  </p:clrMapOvr>
-</p:sld>
-</file>
-
-<file path=ppt/slides/slide2.xml><?xml version="1.0" encoding="utf-8"?>
-<p:sld xmlns:a="http://schemas.openxmlformats.org/drawingml/2006/main" xmlns:r="http://schemas.openxmlformats.org/officeDocument/2006/relationships" xmlns:p="http://schemas.openxmlformats.org/presentationml/2006/main">
-  <p:cSld>
-    <p:spTree>
-      <p:nvGrpSpPr>
-        <p:cNvPr id="1" name=""/>
-        <p:cNvGrpSpPr/>
-        <p:nvPr/>
-      </p:nvGrpSpPr>
-      <p:grpSpPr>
-        <a:xfrm>
-          <a:off x="0" y="0"/>
-          <a:ext cx="0" cy="0"/>
-          <a:chOff x="0" y="0"/>
-          <a:chExt cx="0" cy="0"/>
-        </a:xfrm>
-      </p:grpSpPr>
-      <p:sp>
-        <p:nvSpPr>
-          <p:cNvPr id="30" name="Explosion 2 29"/>
+      <p:sp>
+        <p:nvSpPr>
+          <p:cNvPr id="45" name="TextBox 44"/>
+          <p:cNvSpPr txBox="1"/>
+          <p:nvPr/>
+        </p:nvSpPr>
+        <p:spPr>
+          <a:xfrm>
+            <a:off x="2679128" y="4346534"/>
+            <a:ext cx="1663654" cy="276999"/>
+          </a:xfrm>
+          <a:prstGeom prst="rect">
+            <a:avLst/>
+          </a:prstGeom>
+          <a:noFill/>
+        </p:spPr>
+        <p:txBody>
+          <a:bodyPr wrap="square" rtlCol="0">
+            <a:spAutoFit/>
+          </a:bodyPr>
+          <a:lstStyle/>
+          <a:p>
+            <a:pPr algn="ctr"/>
+            <a:r>
+              <a:rPr lang="en-US" sz="1200" dirty="0" smtClean="0">
+                <a:latin typeface="+mj-lt"/>
+              </a:rPr>
+              <a:t>Output: model objects</a:t>
+            </a:r>
+            <a:endParaRPr lang="en-US" sz="1200" dirty="0">
+              <a:latin typeface="+mj-lt"/>
+            </a:endParaRPr>
+          </a:p>
+        </p:txBody>
+      </p:sp>
+      <p:sp>
+        <p:nvSpPr>
+          <p:cNvPr id="46" name="Rectangle 45"/>
           <p:cNvSpPr/>
           <p:nvPr/>
         </p:nvSpPr>
         <p:spPr>
           <a:xfrm>
-            <a:off x="55051" y="1150144"/>
-            <a:ext cx="3051607" cy="2694506"/>
-          </a:xfrm>
-          <a:prstGeom prst="irregularSeal2">
+            <a:off x="2601956" y="4001855"/>
+            <a:ext cx="1707826" cy="369332"/>
+          </a:xfrm>
+          <a:prstGeom prst="rect">
             <a:avLst/>
           </a:prstGeom>
         </p:spPr>
-        <p:style>
-          <a:lnRef idx="1">
-            <a:schemeClr val="accent3"/>
-          </a:lnRef>
-          <a:fillRef idx="2">
-            <a:schemeClr val="accent3"/>
-          </a:fillRef>
-          <a:effectRef idx="1">
-            <a:schemeClr val="accent3"/>
-          </a:effectRef>
-          <a:fontRef idx="minor">
-            <a:schemeClr val="dk1"/>
-          </a:fontRef>
-        </p:style>
-        <p:txBody>
-          <a:bodyPr rtlCol="0" anchor="ctr"/>
+        <p:txBody>
+          <a:bodyPr wrap="square">
+            <a:spAutoFit/>
+          </a:bodyPr>
           <a:lstStyle/>
           <a:p>
             <a:pPr algn="ctr"/>
+            <a:r>
+              <a:rPr lang="en-US" dirty="0" smtClean="0">
+                <a:solidFill>
+                  <a:schemeClr val="tx1"/>
+                </a:solidFill>
+                <a:latin typeface="Comic Sans MS" panose="030F0702030302020204" pitchFamily="66" charset="0"/>
+              </a:rPr>
+              <a:t>D: </a:t>
+            </a:r>
+            <a:r>
+              <a:rPr lang="en-US" sz="1200" dirty="0" smtClean="0">
+                <a:latin typeface="Comic Sans MS" panose="030F0702030302020204" pitchFamily="66" charset="0"/>
+              </a:rPr>
+              <a:t>Build </a:t>
+            </a:r>
+            <a:r>
+              <a:rPr lang="en-US" sz="1200" dirty="0" smtClean="0">
+                <a:latin typeface="Comic Sans MS" panose="030F0702030302020204" pitchFamily="66" charset="0"/>
+              </a:rPr>
+              <a:t>models</a:t>
+            </a:r>
             <a:endParaRPr lang="en-US" sz="1200" dirty="0">
-              <a:solidFill>
-                <a:schemeClr val="tx1"/>
-              </a:solidFill>
               <a:latin typeface="Comic Sans MS" panose="030F0702030302020204" pitchFamily="66" charset="0"/>
             </a:endParaRPr>
           </a:p>
         </p:txBody>
       </p:sp>
-      <p:sp>
-        <p:nvSpPr>
-          <p:cNvPr id="31" name="Explosion 2 30"/>
-          <p:cNvSpPr/>
-          <p:nvPr/>
-        </p:nvSpPr>
-        <p:spPr>
-          <a:xfrm>
-            <a:off x="3670591" y="1215069"/>
-            <a:ext cx="3051607" cy="2694506"/>
-          </a:xfrm>
-          <a:prstGeom prst="irregularSeal2">
-            <a:avLst/>
-          </a:prstGeom>
-        </p:spPr>
-        <p:style>
-          <a:lnRef idx="1">
-            <a:schemeClr val="accent3"/>
-          </a:lnRef>
-          <a:fillRef idx="2">
-            <a:schemeClr val="accent3"/>
-          </a:fillRef>
-          <a:effectRef idx="1">
-            <a:schemeClr val="accent3"/>
-          </a:effectRef>
-          <a:fontRef idx="minor">
-            <a:schemeClr val="dk1"/>
-          </a:fontRef>
-        </p:style>
-        <p:txBody>
-          <a:bodyPr rtlCol="0" anchor="ctr"/>
-          <a:lstStyle/>
-          <a:p>
-            <a:pPr algn="ctr"/>
-            <a:endParaRPr lang="en-US" sz="1200" dirty="0">
-              <a:solidFill>
-                <a:schemeClr val="tx1"/>
-              </a:solidFill>
-              <a:latin typeface="Comic Sans MS" panose="030F0702030302020204" pitchFamily="66" charset="0"/>
-            </a:endParaRPr>
-          </a:p>
-        </p:txBody>
-      </p:sp>
       <p:cxnSp>
         <p:nvCxnSpPr>
-          <p:cNvPr id="32" name="Straight Arrow Connector 31"/>
+          <p:cNvPr id="19" name="Straight Arrow Connector 18"/>
           <p:cNvCxnSpPr/>
           <p:nvPr/>
         </p:nvCxnSpPr>
         <p:spPr>
-          <a:xfrm flipV="1">
-            <a:off x="2712004" y="2654305"/>
-            <a:ext cx="1125415" cy="21643"/>
+          <a:xfrm>
+            <a:off x="1583398" y="3991367"/>
+            <a:ext cx="828999" cy="381461"/>
           </a:xfrm>
           <a:prstGeom prst="straightConnector1">
             <a:avLst/>
           </a:prstGeom>
           <a:ln w="57150">
+            <a:solidFill>
+              <a:schemeClr val="accent6"/>
+            </a:solidFill>
             <a:tailEnd type="triangle"/>
           </a:ln>
         </p:spPr>
@@ -3691,14 +3801,14 @@
       </p:cxnSp>
       <p:sp>
         <p:nvSpPr>
-          <p:cNvPr id="33" name="TextBox 32"/>
+          <p:cNvPr id="23" name="TextBox 22"/>
           <p:cNvSpPr txBox="1"/>
           <p:nvPr/>
         </p:nvSpPr>
         <p:spPr>
           <a:xfrm>
-            <a:off x="2528590" y="2337228"/>
-            <a:ext cx="1337978" cy="617733"/>
+            <a:off x="627432" y="5842148"/>
+            <a:ext cx="1663654" cy="646331"/>
           </a:xfrm>
           <a:prstGeom prst="rect">
             <a:avLst/>
@@ -3711,84 +3821,36 @@
           </a:bodyPr>
           <a:lstStyle/>
           <a:p>
-            <a:pPr algn="ctr">
-              <a:lnSpc>
-                <a:spcPct val="150000"/>
-              </a:lnSpc>
-            </a:pPr>
+            <a:pPr algn="ctr"/>
             <a:r>
               <a:rPr lang="en-US" sz="1200" dirty="0" smtClean="0">
                 <a:latin typeface="+mj-lt"/>
               </a:rPr>
-              <a:t>A output</a:t>
-            </a:r>
-          </a:p>
-          <a:p>
-            <a:pPr algn="ctr">
-              <a:lnSpc>
-                <a:spcPct val="150000"/>
-              </a:lnSpc>
-            </a:pPr>
-            <a:r>
-              <a:rPr lang="en-US" sz="1200" dirty="0" smtClean="0">
+              <a:t>Output: </a:t>
+            </a:r>
+            <a:r>
+              <a:rPr lang="en-US" sz="1200" dirty="0">
                 <a:latin typeface="+mj-lt"/>
               </a:rPr>
-              <a:t>used in B</a:t>
-            </a:r>
-            <a:endParaRPr lang="en-US" sz="1200" dirty="0">
-              <a:latin typeface="+mj-lt"/>
-            </a:endParaRPr>
-          </a:p>
-        </p:txBody>
-      </p:sp>
-      <p:sp>
-        <p:nvSpPr>
-          <p:cNvPr id="34" name="TextBox 33"/>
-          <p:cNvSpPr txBox="1"/>
+              <a:t>(figures &amp; tables for  manuscript or website)</a:t>
+            </a:r>
+          </a:p>
+        </p:txBody>
+      </p:sp>
+      <p:sp>
+        <p:nvSpPr>
+          <p:cNvPr id="24" name="Rectangle 23"/>
+          <p:cNvSpPr/>
           <p:nvPr/>
         </p:nvSpPr>
         <p:spPr>
           <a:xfrm>
-            <a:off x="451028" y="2697991"/>
-            <a:ext cx="1848519" cy="276999"/>
+            <a:off x="640036" y="5391258"/>
+            <a:ext cx="1707826" cy="553998"/>
           </a:xfrm>
           <a:prstGeom prst="rect">
             <a:avLst/>
           </a:prstGeom>
-          <a:noFill/>
-        </p:spPr>
-        <p:txBody>
-          <a:bodyPr wrap="none" rtlCol="0">
-            <a:spAutoFit/>
-          </a:bodyPr>
-          <a:lstStyle/>
-          <a:p>
-            <a:r>
-              <a:rPr lang="en-US" sz="1200" dirty="0" smtClean="0">
-                <a:latin typeface="+mj-lt"/>
-              </a:rPr>
-              <a:t>Output: long format tables</a:t>
-            </a:r>
-            <a:endParaRPr lang="en-US" sz="1200" dirty="0">
-              <a:latin typeface="+mj-lt"/>
-            </a:endParaRPr>
-          </a:p>
-        </p:txBody>
-      </p:sp>
-      <p:sp>
-        <p:nvSpPr>
-          <p:cNvPr id="35" name="Rectangle 34"/>
-          <p:cNvSpPr/>
-          <p:nvPr/>
-        </p:nvSpPr>
-        <p:spPr>
-          <a:xfrm>
-            <a:off x="451028" y="1935205"/>
-            <a:ext cx="2077562" cy="738664"/>
-          </a:xfrm>
-          <a:prstGeom prst="rect">
-            <a:avLst/>
-          </a:prstGeom>
         </p:spPr>
         <p:txBody>
           <a:bodyPr wrap="square">
@@ -3804,221 +3866,19 @@
                 </a:solidFill>
                 <a:latin typeface="Comic Sans MS" panose="030F0702030302020204" pitchFamily="66" charset="0"/>
               </a:rPr>
-              <a:t>Aargh</a:t>
-            </a:r>
-          </a:p>
-          <a:p>
-            <a:pPr algn="ctr"/>
-            <a:r>
-              <a:rPr lang="en-US" sz="1200" dirty="0">
-                <a:latin typeface="Comic Sans MS" panose="030F0702030302020204" pitchFamily="66" charset="0"/>
-              </a:rPr>
-              <a:t>Data acquisition, quality-checking, and clean up</a:t>
-            </a:r>
-          </a:p>
-        </p:txBody>
-      </p:sp>
-      <p:sp>
-        <p:nvSpPr>
-          <p:cNvPr id="36" name="TextBox 35"/>
-          <p:cNvSpPr txBox="1"/>
-          <p:nvPr/>
-        </p:nvSpPr>
-        <p:spPr>
-          <a:xfrm>
-            <a:off x="4164884" y="2836490"/>
-            <a:ext cx="1663654" cy="276999"/>
-          </a:xfrm>
-          <a:prstGeom prst="rect">
-            <a:avLst/>
-          </a:prstGeom>
-          <a:noFill/>
-        </p:spPr>
-        <p:txBody>
-          <a:bodyPr wrap="square" rtlCol="0">
-            <a:spAutoFit/>
-          </a:bodyPr>
-          <a:lstStyle/>
-          <a:p>
-            <a:pPr algn="ctr"/>
-            <a:r>
-              <a:rPr lang="en-US" sz="1200" dirty="0" smtClean="0">
-                <a:latin typeface="+mj-lt"/>
-              </a:rPr>
-              <a:t>Output: offset per PKEY</a:t>
-            </a:r>
-            <a:endParaRPr lang="en-US" sz="1200" dirty="0">
-              <a:latin typeface="+mj-lt"/>
-            </a:endParaRPr>
-          </a:p>
-        </p:txBody>
-      </p:sp>
-      <p:sp>
-        <p:nvSpPr>
-          <p:cNvPr id="37" name="Rectangle 36"/>
-          <p:cNvSpPr/>
-          <p:nvPr/>
-        </p:nvSpPr>
-        <p:spPr>
-          <a:xfrm>
-            <a:off x="4364194" y="1902739"/>
-            <a:ext cx="1707826" cy="923330"/>
-          </a:xfrm>
-          <a:prstGeom prst="rect">
-            <a:avLst/>
-          </a:prstGeom>
-        </p:spPr>
-        <p:txBody>
-          <a:bodyPr wrap="square">
-            <a:spAutoFit/>
-          </a:bodyPr>
-          <a:lstStyle/>
-          <a:p>
-            <a:pPr algn="ctr"/>
-            <a:r>
-              <a:rPr lang="en-US" dirty="0" err="1" smtClean="0">
-                <a:solidFill>
-                  <a:schemeClr val="tx1"/>
-                </a:solidFill>
-                <a:latin typeface="Comic Sans MS" panose="030F0702030302020204" pitchFamily="66" charset="0"/>
-              </a:rPr>
-              <a:t>Boink</a:t>
-            </a:r>
-            <a:endParaRPr lang="en-US" dirty="0" smtClean="0">
-              <a:solidFill>
-                <a:schemeClr val="tx1"/>
-              </a:solidFill>
-              <a:latin typeface="Comic Sans MS" panose="030F0702030302020204" pitchFamily="66" charset="0"/>
-            </a:endParaRPr>
-          </a:p>
-          <a:p>
-            <a:pPr algn="ctr"/>
-            <a:r>
-              <a:rPr lang="en-US" sz="1200" dirty="0">
-                <a:latin typeface="Comic Sans MS" panose="030F0702030302020204" pitchFamily="66" charset="0"/>
-              </a:rPr>
-              <a:t>Estimate detectability (QPAD) offsets</a:t>
-            </a:r>
-          </a:p>
-        </p:txBody>
-      </p:sp>
-      <p:sp>
-        <p:nvSpPr>
-          <p:cNvPr id="38" name="Explosion 2 37"/>
-          <p:cNvSpPr/>
-          <p:nvPr/>
-        </p:nvSpPr>
-        <p:spPr>
-          <a:xfrm>
-            <a:off x="1420662" y="3811582"/>
-            <a:ext cx="3051607" cy="2694506"/>
-          </a:xfrm>
-          <a:prstGeom prst="irregularSeal2">
-            <a:avLst/>
-          </a:prstGeom>
-        </p:spPr>
-        <p:style>
-          <a:lnRef idx="1">
-            <a:schemeClr val="accent3"/>
-          </a:lnRef>
-          <a:fillRef idx="2">
-            <a:schemeClr val="accent3"/>
-          </a:fillRef>
-          <a:effectRef idx="1">
-            <a:schemeClr val="accent3"/>
-          </a:effectRef>
-          <a:fontRef idx="minor">
-            <a:schemeClr val="dk1"/>
-          </a:fontRef>
-        </p:style>
-        <p:txBody>
-          <a:bodyPr rtlCol="0" anchor="ctr"/>
-          <a:lstStyle/>
-          <a:p>
-            <a:pPr algn="ctr"/>
-            <a:endParaRPr lang="en-US" sz="1200" dirty="0">
-              <a:solidFill>
-                <a:schemeClr val="tx1"/>
-              </a:solidFill>
-              <a:latin typeface="Comic Sans MS" panose="030F0702030302020204" pitchFamily="66" charset="0"/>
-            </a:endParaRPr>
-          </a:p>
-        </p:txBody>
-      </p:sp>
-      <p:sp>
-        <p:nvSpPr>
-          <p:cNvPr id="39" name="TextBox 38"/>
-          <p:cNvSpPr txBox="1"/>
-          <p:nvPr/>
-        </p:nvSpPr>
-        <p:spPr>
-          <a:xfrm>
-            <a:off x="1914955" y="5433003"/>
-            <a:ext cx="1663654" cy="461665"/>
-          </a:xfrm>
-          <a:prstGeom prst="rect">
-            <a:avLst/>
-          </a:prstGeom>
-          <a:noFill/>
-        </p:spPr>
-        <p:txBody>
-          <a:bodyPr wrap="square" rtlCol="0">
-            <a:spAutoFit/>
-          </a:bodyPr>
-          <a:lstStyle/>
-          <a:p>
-            <a:pPr algn="ctr"/>
-            <a:r>
-              <a:rPr lang="en-US" sz="1200" dirty="0" smtClean="0">
-                <a:latin typeface="+mj-lt"/>
-              </a:rPr>
-              <a:t>Output: wide formatted table(s)</a:t>
-            </a:r>
-            <a:endParaRPr lang="en-US" sz="1200" dirty="0">
-              <a:latin typeface="+mj-lt"/>
-            </a:endParaRPr>
-          </a:p>
-        </p:txBody>
-      </p:sp>
-      <p:sp>
-        <p:nvSpPr>
-          <p:cNvPr id="40" name="Rectangle 39"/>
-          <p:cNvSpPr/>
-          <p:nvPr/>
-        </p:nvSpPr>
-        <p:spPr>
-          <a:xfrm>
-            <a:off x="2114265" y="4499252"/>
-            <a:ext cx="1707826" cy="923330"/>
-          </a:xfrm>
-          <a:prstGeom prst="rect">
-            <a:avLst/>
-          </a:prstGeom>
-        </p:spPr>
-        <p:txBody>
-          <a:bodyPr wrap="square">
-            <a:spAutoFit/>
-          </a:bodyPr>
-          <a:lstStyle/>
-          <a:p>
-            <a:pPr algn="ctr"/>
-            <a:r>
-              <a:rPr lang="en-US" dirty="0" smtClean="0">
-                <a:solidFill>
-                  <a:schemeClr val="tx1"/>
-                </a:solidFill>
-                <a:latin typeface="Comic Sans MS" panose="030F0702030302020204" pitchFamily="66" charset="0"/>
-              </a:rPr>
-              <a:t>Clang</a:t>
-            </a:r>
-          </a:p>
-          <a:p>
-            <a:pPr algn="ctr"/>
+              <a:t>E: </a:t>
+            </a:r>
             <a:r>
               <a:rPr lang="en-US" sz="1200" dirty="0" smtClean="0">
                 <a:latin typeface="Comic Sans MS" panose="030F0702030302020204" pitchFamily="66" charset="0"/>
               </a:rPr>
-              <a:t>Create all-inclusive data package for downstream analyses</a:t>
+              <a:t>Summarize </a:t>
+            </a:r>
+            <a:r>
+              <a:rPr lang="en-US" sz="1200" dirty="0" smtClean="0">
+                <a:latin typeface="Comic Sans MS" panose="030F0702030302020204" pitchFamily="66" charset="0"/>
+              </a:rPr>
+              <a:t>&amp; visualize output</a:t>
             </a:r>
             <a:endParaRPr lang="en-US" sz="1200" dirty="0">
               <a:latin typeface="Comic Sans MS" panose="030F0702030302020204" pitchFamily="66" charset="0"/>
@@ -4028,19 +3888,22 @@
       </p:sp>
       <p:cxnSp>
         <p:nvCxnSpPr>
-          <p:cNvPr id="41" name="Straight Arrow Connector 40"/>
+          <p:cNvPr id="25" name="Straight Arrow Connector 24"/>
           <p:cNvCxnSpPr/>
           <p:nvPr/>
         </p:nvCxnSpPr>
         <p:spPr>
-          <a:xfrm>
-            <a:off x="1900572" y="3315592"/>
-            <a:ext cx="730272" cy="737390"/>
+          <a:xfrm flipH="1">
+            <a:off x="2152152" y="4827999"/>
+            <a:ext cx="728119" cy="550843"/>
           </a:xfrm>
           <a:prstGeom prst="straightConnector1">
             <a:avLst/>
           </a:prstGeom>
           <a:ln w="57150">
+            <a:solidFill>
+              <a:schemeClr val="accent2"/>
+            </a:solidFill>
             <a:tailEnd type="triangle"/>
           </a:ln>
         </p:spPr>
@@ -4059,21 +3922,108 @@
           </a:fontRef>
         </p:style>
       </p:cxnSp>
+      <p:sp>
+        <p:nvSpPr>
+          <p:cNvPr id="49" name="TextBox 48"/>
+          <p:cNvSpPr txBox="1"/>
+          <p:nvPr/>
+        </p:nvSpPr>
+        <p:spPr>
+          <a:xfrm>
+            <a:off x="4607469" y="5884880"/>
+            <a:ext cx="1511910" cy="646331"/>
+          </a:xfrm>
+          <a:prstGeom prst="rect">
+            <a:avLst/>
+          </a:prstGeom>
+          <a:noFill/>
+        </p:spPr>
+        <p:txBody>
+          <a:bodyPr wrap="square" rtlCol="0">
+            <a:spAutoFit/>
+          </a:bodyPr>
+          <a:lstStyle/>
+          <a:p>
+            <a:pPr algn="ctr"/>
+            <a:r>
+              <a:rPr lang="en-US" sz="1200" dirty="0" smtClean="0">
+                <a:latin typeface="+mj-lt"/>
+              </a:rPr>
+              <a:t>Output: raster maps, population size tables, </a:t>
+            </a:r>
+            <a:endParaRPr lang="en-US" sz="1200" dirty="0">
+              <a:latin typeface="+mj-lt"/>
+            </a:endParaRPr>
+          </a:p>
+        </p:txBody>
+      </p:sp>
+      <p:sp>
+        <p:nvSpPr>
+          <p:cNvPr id="50" name="Rectangle 49"/>
+          <p:cNvSpPr/>
+          <p:nvPr/>
+        </p:nvSpPr>
+        <p:spPr>
+          <a:xfrm>
+            <a:off x="4509511" y="5206592"/>
+            <a:ext cx="1707826" cy="738664"/>
+          </a:xfrm>
+          <a:prstGeom prst="rect">
+            <a:avLst/>
+          </a:prstGeom>
+        </p:spPr>
+        <p:txBody>
+          <a:bodyPr wrap="square">
+            <a:spAutoFit/>
+          </a:bodyPr>
+          <a:lstStyle/>
+          <a:p>
+            <a:pPr algn="ctr"/>
+            <a:r>
+              <a:rPr lang="en-US" dirty="0" smtClean="0">
+                <a:solidFill>
+                  <a:schemeClr val="tx1"/>
+                </a:solidFill>
+                <a:latin typeface="Comic Sans MS" panose="030F0702030302020204" pitchFamily="66" charset="0"/>
+              </a:rPr>
+              <a:t>G: </a:t>
+            </a:r>
+            <a:r>
+              <a:rPr lang="en-US" sz="1200" dirty="0" smtClean="0">
+                <a:latin typeface="Comic Sans MS" panose="030F0702030302020204" pitchFamily="66" charset="0"/>
+              </a:rPr>
+              <a:t>Derive </a:t>
+            </a:r>
+            <a:r>
+              <a:rPr lang="en-US" sz="1200" dirty="0" smtClean="0">
+                <a:latin typeface="Comic Sans MS" panose="030F0702030302020204" pitchFamily="66" charset="0"/>
+              </a:rPr>
+              <a:t>data products based on model results</a:t>
+            </a:r>
+            <a:endParaRPr lang="en-US" sz="1200" dirty="0">
+              <a:latin typeface="Comic Sans MS" panose="030F0702030302020204" pitchFamily="66" charset="0"/>
+            </a:endParaRPr>
+          </a:p>
+        </p:txBody>
+      </p:sp>
       <p:cxnSp>
         <p:nvCxnSpPr>
-          <p:cNvPr id="42" name="Straight Arrow Connector 41"/>
+          <p:cNvPr id="51" name="Straight Arrow Connector 50"/>
           <p:cNvCxnSpPr/>
           <p:nvPr/>
         </p:nvCxnSpPr>
         <p:spPr>
-          <a:xfrm flipH="1">
-            <a:off x="3106658" y="3169859"/>
-            <a:ext cx="844385" cy="912858"/>
+          <a:xfrm>
+            <a:off x="3744146" y="4827999"/>
+            <a:ext cx="565636" cy="550843"/>
           </a:xfrm>
           <a:prstGeom prst="straightConnector1">
             <a:avLst/>
           </a:prstGeom>
           <a:ln w="57150">
+            <a:solidFill>
+              <a:schemeClr val="accent2"/>
+            </a:solidFill>
             <a:tailEnd type="triangle"/>
           </a:ln>
         </p:spPr>
@@ -4094,14 +4044,14 @@
       </p:cxnSp>
       <p:sp>
         <p:nvSpPr>
-          <p:cNvPr id="43" name="TextBox 42"/>
+          <p:cNvPr id="53" name="TextBox 52"/>
           <p:cNvSpPr txBox="1"/>
           <p:nvPr/>
         </p:nvSpPr>
         <p:spPr>
           <a:xfrm>
-            <a:off x="2299547" y="3458930"/>
-            <a:ext cx="1162498" cy="461665"/>
+            <a:off x="5156651" y="2204255"/>
+            <a:ext cx="1576175" cy="646331"/>
           </a:xfrm>
           <a:prstGeom prst="rect">
             <a:avLst/>
@@ -4109,7 +4059,7 @@
           <a:noFill/>
         </p:spPr>
         <p:txBody>
-          <a:bodyPr wrap="none" rtlCol="0">
+          <a:bodyPr wrap="square" rtlCol="0">
             <a:spAutoFit/>
           </a:bodyPr>
           <a:lstStyle/>
@@ -4119,16 +4069,19 @@
               <a:rPr lang="en-US" sz="1200" dirty="0" smtClean="0">
                 <a:latin typeface="+mj-lt"/>
               </a:rPr>
-              <a:t>Combine A and</a:t>
-            </a:r>
-          </a:p>
-          <a:p>
-            <a:pPr algn="ctr"/>
+              <a:t>Output: series of </a:t>
+            </a:r>
+            <a:r>
+              <a:rPr lang="en-US" sz="1200" dirty="0" err="1" smtClean="0">
+                <a:latin typeface="+mj-lt"/>
+              </a:rPr>
+              <a:t>rasters</a:t>
+            </a:r>
             <a:r>
               <a:rPr lang="en-US" sz="1200" dirty="0" smtClean="0">
                 <a:latin typeface="+mj-lt"/>
               </a:rPr>
-              <a:t>B to yield C</a:t>
+              <a:t> or tables with covariates per grid cell</a:t>
             </a:r>
             <a:endParaRPr lang="en-US" sz="1200" dirty="0">
               <a:latin typeface="+mj-lt"/>
@@ -4138,96 +4091,18 @@
       </p:sp>
       <p:sp>
         <p:nvSpPr>
-          <p:cNvPr id="44" name="Explosion 2 43"/>
+          <p:cNvPr id="54" name="Rectangle 53"/>
           <p:cNvSpPr/>
           <p:nvPr/>
         </p:nvSpPr>
         <p:spPr>
-          <a:xfrm rot="438252">
-            <a:off x="4290384" y="5527511"/>
-            <a:ext cx="2658511" cy="2060154"/>
-          </a:xfrm>
-          <a:prstGeom prst="irregularSeal2">
-            <a:avLst/>
-          </a:prstGeom>
-        </p:spPr>
-        <p:style>
-          <a:lnRef idx="1">
-            <a:schemeClr val="accent3"/>
-          </a:lnRef>
-          <a:fillRef idx="2">
-            <a:schemeClr val="accent3"/>
-          </a:fillRef>
-          <a:effectRef idx="1">
-            <a:schemeClr val="accent3"/>
-          </a:effectRef>
-          <a:fontRef idx="minor">
-            <a:schemeClr val="dk1"/>
-          </a:fontRef>
-        </p:style>
-        <p:txBody>
-          <a:bodyPr rtlCol="0" anchor="ctr"/>
-          <a:lstStyle/>
-          <a:p>
-            <a:pPr algn="ctr"/>
-            <a:endParaRPr lang="en-US" sz="1200" dirty="0">
-              <a:solidFill>
-                <a:schemeClr val="tx1"/>
-              </a:solidFill>
-              <a:latin typeface="Comic Sans MS" panose="030F0702030302020204" pitchFamily="66" charset="0"/>
-            </a:endParaRPr>
-          </a:p>
-        </p:txBody>
-      </p:sp>
-      <p:sp>
-        <p:nvSpPr>
-          <p:cNvPr id="45" name="TextBox 44"/>
-          <p:cNvSpPr txBox="1"/>
-          <p:nvPr/>
-        </p:nvSpPr>
-        <p:spPr>
-          <a:xfrm>
-            <a:off x="4718459" y="6698093"/>
-            <a:ext cx="1663654" cy="276999"/>
+          <a:xfrm>
+            <a:off x="5053430" y="1542934"/>
+            <a:ext cx="1804570" cy="738664"/>
           </a:xfrm>
           <a:prstGeom prst="rect">
             <a:avLst/>
           </a:prstGeom>
-          <a:noFill/>
-        </p:spPr>
-        <p:txBody>
-          <a:bodyPr wrap="square" rtlCol="0">
-            <a:spAutoFit/>
-          </a:bodyPr>
-          <a:lstStyle/>
-          <a:p>
-            <a:pPr algn="ctr"/>
-            <a:r>
-              <a:rPr lang="en-US" sz="1200" dirty="0" smtClean="0">
-                <a:latin typeface="+mj-lt"/>
-              </a:rPr>
-              <a:t>Output: model objects</a:t>
-            </a:r>
-            <a:endParaRPr lang="en-US" sz="1200" dirty="0">
-              <a:latin typeface="+mj-lt"/>
-            </a:endParaRPr>
-          </a:p>
-        </p:txBody>
-      </p:sp>
-      <p:sp>
-        <p:nvSpPr>
-          <p:cNvPr id="46" name="Rectangle 45"/>
-          <p:cNvSpPr/>
-          <p:nvPr/>
-        </p:nvSpPr>
-        <p:spPr>
-          <a:xfrm>
-            <a:off x="4718459" y="6118014"/>
-            <a:ext cx="1707826" cy="553998"/>
-          </a:xfrm>
-          <a:prstGeom prst="rect">
-            <a:avLst/>
-          </a:prstGeom>
         </p:spPr>
         <p:txBody>
           <a:bodyPr wrap="square">
@@ -4237,556 +4112,25 @@
           <a:p>
             <a:pPr algn="ctr"/>
             <a:r>
-              <a:rPr lang="en-US" dirty="0" err="1" smtClean="0">
+              <a:rPr lang="en-US" dirty="0" smtClean="0">
                 <a:solidFill>
                   <a:schemeClr val="tx1"/>
                 </a:solidFill>
                 <a:latin typeface="Comic Sans MS" panose="030F0702030302020204" pitchFamily="66" charset="0"/>
               </a:rPr>
-              <a:t>Dingg</a:t>
-            </a:r>
-            <a:endParaRPr lang="en-US" dirty="0" smtClean="0">
-              <a:solidFill>
-                <a:schemeClr val="tx1"/>
-              </a:solidFill>
-              <a:latin typeface="Comic Sans MS" panose="030F0702030302020204" pitchFamily="66" charset="0"/>
-            </a:endParaRPr>
-          </a:p>
-          <a:p>
-            <a:pPr algn="ctr"/>
+              <a:t>F: </a:t>
+            </a:r>
             <a:r>
               <a:rPr lang="en-US" sz="1200" dirty="0" smtClean="0">
                 <a:latin typeface="Comic Sans MS" panose="030F0702030302020204" pitchFamily="66" charset="0"/>
               </a:rPr>
-              <a:t>Build models</a:t>
-            </a:r>
-            <a:endParaRPr lang="en-US" sz="1200" dirty="0">
-              <a:latin typeface="Comic Sans MS" panose="030F0702030302020204" pitchFamily="66" charset="0"/>
-            </a:endParaRPr>
-          </a:p>
-        </p:txBody>
-      </p:sp>
-      <p:cxnSp>
-        <p:nvCxnSpPr>
-          <p:cNvPr id="19" name="Straight Arrow Connector 18"/>
-          <p:cNvCxnSpPr/>
-          <p:nvPr/>
-        </p:nvCxnSpPr>
-        <p:spPr>
-          <a:xfrm>
-            <a:off x="3578609" y="5787509"/>
-            <a:ext cx="893660" cy="580079"/>
-          </a:xfrm>
-          <a:prstGeom prst="straightConnector1">
-            <a:avLst/>
-          </a:prstGeom>
-          <a:ln w="57150">
-            <a:solidFill>
-              <a:schemeClr val="accent6"/>
-            </a:solidFill>
-            <a:tailEnd type="triangle"/>
-          </a:ln>
-        </p:spPr>
-        <p:style>
-          <a:lnRef idx="1">
-            <a:schemeClr val="accent1"/>
-          </a:lnRef>
-          <a:fillRef idx="0">
-            <a:schemeClr val="accent1"/>
-          </a:fillRef>
-          <a:effectRef idx="0">
-            <a:schemeClr val="accent1"/>
-          </a:effectRef>
-          <a:fontRef idx="minor">
-            <a:schemeClr val="tx1"/>
-          </a:fontRef>
-        </p:style>
-      </p:cxnSp>
-      <p:sp>
-        <p:nvSpPr>
-          <p:cNvPr id="22" name="Explosion 2 21"/>
-          <p:cNvSpPr/>
-          <p:nvPr/>
-        </p:nvSpPr>
-        <p:spPr>
-          <a:xfrm>
-            <a:off x="1430006" y="7762538"/>
-            <a:ext cx="3051607" cy="2694506"/>
-          </a:xfrm>
-          <a:prstGeom prst="irregularSeal2">
-            <a:avLst/>
-          </a:prstGeom>
-        </p:spPr>
-        <p:style>
-          <a:lnRef idx="1">
-            <a:schemeClr val="accent3"/>
-          </a:lnRef>
-          <a:fillRef idx="2">
-            <a:schemeClr val="accent3"/>
-          </a:fillRef>
-          <a:effectRef idx="1">
-            <a:schemeClr val="accent3"/>
-          </a:effectRef>
-          <a:fontRef idx="minor">
-            <a:schemeClr val="dk1"/>
-          </a:fontRef>
-        </p:style>
-        <p:txBody>
-          <a:bodyPr rtlCol="0" anchor="ctr"/>
-          <a:lstStyle/>
-          <a:p>
-            <a:pPr algn="ctr"/>
-            <a:endParaRPr lang="en-US" sz="1200" dirty="0">
-              <a:solidFill>
-                <a:schemeClr val="tx1"/>
-              </a:solidFill>
-              <a:latin typeface="Comic Sans MS" panose="030F0702030302020204" pitchFamily="66" charset="0"/>
-            </a:endParaRPr>
-          </a:p>
-        </p:txBody>
-      </p:sp>
-      <p:sp>
-        <p:nvSpPr>
-          <p:cNvPr id="23" name="TextBox 22"/>
-          <p:cNvSpPr txBox="1"/>
-          <p:nvPr/>
-        </p:nvSpPr>
-        <p:spPr>
-          <a:xfrm>
-            <a:off x="2093109" y="9104648"/>
-            <a:ext cx="1663654" cy="646331"/>
-          </a:xfrm>
-          <a:prstGeom prst="rect">
-            <a:avLst/>
-          </a:prstGeom>
-          <a:noFill/>
-        </p:spPr>
-        <p:txBody>
-          <a:bodyPr wrap="square" rtlCol="0">
-            <a:spAutoFit/>
-          </a:bodyPr>
-          <a:lstStyle/>
-          <a:p>
-            <a:pPr algn="ctr"/>
-            <a:r>
-              <a:rPr lang="en-US" sz="1200" dirty="0" smtClean="0">
-                <a:latin typeface="+mj-lt"/>
-              </a:rPr>
-              <a:t>Output: </a:t>
-            </a:r>
-            <a:r>
-              <a:rPr lang="en-US" sz="1200" dirty="0">
-                <a:latin typeface="+mj-lt"/>
-              </a:rPr>
-              <a:t>(figures &amp; tables for  manuscript or website)</a:t>
-            </a:r>
-            <a:endParaRPr lang="en-US" sz="1200" dirty="0">
-              <a:latin typeface="+mj-lt"/>
-            </a:endParaRPr>
-          </a:p>
-        </p:txBody>
-      </p:sp>
-      <p:sp>
-        <p:nvSpPr>
-          <p:cNvPr id="24" name="Rectangle 23"/>
-          <p:cNvSpPr/>
-          <p:nvPr/>
-        </p:nvSpPr>
-        <p:spPr>
-          <a:xfrm>
-            <a:off x="2261207" y="8437528"/>
-            <a:ext cx="1707826" cy="738664"/>
-          </a:xfrm>
-          <a:prstGeom prst="rect">
-            <a:avLst/>
-          </a:prstGeom>
-        </p:spPr>
-        <p:txBody>
-          <a:bodyPr wrap="square">
-            <a:spAutoFit/>
-          </a:bodyPr>
-          <a:lstStyle/>
-          <a:p>
-            <a:pPr algn="ctr"/>
-            <a:r>
-              <a:rPr lang="en-US" dirty="0" err="1" smtClean="0">
-                <a:solidFill>
-                  <a:schemeClr val="tx1"/>
-                </a:solidFill>
-                <a:latin typeface="Comic Sans MS" panose="030F0702030302020204" pitchFamily="66" charset="0"/>
-              </a:rPr>
-              <a:t>Eeouw</a:t>
-            </a:r>
-            <a:endParaRPr lang="en-US" dirty="0" smtClean="0">
-              <a:solidFill>
-                <a:schemeClr val="tx1"/>
-              </a:solidFill>
-              <a:latin typeface="Comic Sans MS" panose="030F0702030302020204" pitchFamily="66" charset="0"/>
-            </a:endParaRPr>
-          </a:p>
-          <a:p>
-            <a:pPr algn="ctr"/>
+              <a:t>Extract </a:t>
+            </a:r>
             <a:r>
               <a:rPr lang="en-US" sz="1200" dirty="0" smtClean="0">
                 <a:latin typeface="Comic Sans MS" panose="030F0702030302020204" pitchFamily="66" charset="0"/>
               </a:rPr>
-              <a:t>Summarize &amp; visualize output</a:t>
-            </a:r>
-            <a:endParaRPr lang="en-US" sz="1200" dirty="0">
-              <a:latin typeface="Comic Sans MS" panose="030F0702030302020204" pitchFamily="66" charset="0"/>
-            </a:endParaRPr>
-          </a:p>
-        </p:txBody>
-      </p:sp>
-      <p:cxnSp>
-        <p:nvCxnSpPr>
-          <p:cNvPr id="25" name="Straight Arrow Connector 24"/>
-          <p:cNvCxnSpPr/>
-          <p:nvPr/>
-        </p:nvCxnSpPr>
-        <p:spPr>
-          <a:xfrm flipH="1">
-            <a:off x="4065225" y="7282148"/>
-            <a:ext cx="584486" cy="1155380"/>
-          </a:xfrm>
-          <a:prstGeom prst="straightConnector1">
-            <a:avLst/>
-          </a:prstGeom>
-          <a:ln w="57150">
-            <a:solidFill>
-              <a:schemeClr val="accent2"/>
-            </a:solidFill>
-            <a:tailEnd type="triangle"/>
-          </a:ln>
-        </p:spPr>
-        <p:style>
-          <a:lnRef idx="1">
-            <a:schemeClr val="accent1"/>
-          </a:lnRef>
-          <a:fillRef idx="0">
-            <a:schemeClr val="accent1"/>
-          </a:fillRef>
-          <a:effectRef idx="0">
-            <a:schemeClr val="accent1"/>
-          </a:effectRef>
-          <a:fontRef idx="minor">
-            <a:schemeClr val="tx1"/>
-          </a:fontRef>
-        </p:style>
-      </p:cxnSp>
-      <p:sp>
-        <p:nvSpPr>
-          <p:cNvPr id="48" name="Explosion 2 47"/>
-          <p:cNvSpPr/>
-          <p:nvPr/>
-        </p:nvSpPr>
-        <p:spPr>
-          <a:xfrm>
-            <a:off x="5431718" y="7762538"/>
-            <a:ext cx="3051607" cy="2694506"/>
-          </a:xfrm>
-          <a:prstGeom prst="irregularSeal2">
-            <a:avLst/>
-          </a:prstGeom>
-        </p:spPr>
-        <p:style>
-          <a:lnRef idx="1">
-            <a:schemeClr val="accent3"/>
-          </a:lnRef>
-          <a:fillRef idx="2">
-            <a:schemeClr val="accent3"/>
-          </a:fillRef>
-          <a:effectRef idx="1">
-            <a:schemeClr val="accent3"/>
-          </a:effectRef>
-          <a:fontRef idx="minor">
-            <a:schemeClr val="dk1"/>
-          </a:fontRef>
-        </p:style>
-        <p:txBody>
-          <a:bodyPr rtlCol="0" anchor="ctr"/>
-          <a:lstStyle/>
-          <a:p>
-            <a:pPr algn="ctr"/>
-            <a:endParaRPr lang="en-US" sz="1200" dirty="0">
-              <a:solidFill>
-                <a:schemeClr val="tx1"/>
-              </a:solidFill>
-              <a:latin typeface="Comic Sans MS" panose="030F0702030302020204" pitchFamily="66" charset="0"/>
-            </a:endParaRPr>
-          </a:p>
-        </p:txBody>
-      </p:sp>
-      <p:sp>
-        <p:nvSpPr>
-          <p:cNvPr id="49" name="TextBox 48"/>
-          <p:cNvSpPr txBox="1"/>
-          <p:nvPr/>
-        </p:nvSpPr>
-        <p:spPr>
-          <a:xfrm>
-            <a:off x="6026227" y="9262619"/>
-            <a:ext cx="1511910" cy="646331"/>
-          </a:xfrm>
-          <a:prstGeom prst="rect">
-            <a:avLst/>
-          </a:prstGeom>
-          <a:noFill/>
-        </p:spPr>
-        <p:txBody>
-          <a:bodyPr wrap="square" rtlCol="0">
-            <a:spAutoFit/>
-          </a:bodyPr>
-          <a:lstStyle/>
-          <a:p>
-            <a:pPr algn="ctr"/>
-            <a:r>
-              <a:rPr lang="en-US" sz="1200" dirty="0" smtClean="0">
-                <a:latin typeface="+mj-lt"/>
-              </a:rPr>
-              <a:t>Output: </a:t>
-            </a:r>
-            <a:r>
-              <a:rPr lang="en-US" sz="1200" dirty="0" smtClean="0">
-                <a:latin typeface="+mj-lt"/>
-              </a:rPr>
-              <a:t>raster maps, population size tables, </a:t>
-            </a:r>
-            <a:endParaRPr lang="en-US" sz="1200" dirty="0">
-              <a:latin typeface="+mj-lt"/>
-            </a:endParaRPr>
-          </a:p>
-        </p:txBody>
-      </p:sp>
-      <p:sp>
-        <p:nvSpPr>
-          <p:cNvPr id="50" name="Rectangle 49"/>
-          <p:cNvSpPr/>
-          <p:nvPr/>
-        </p:nvSpPr>
-        <p:spPr>
-          <a:xfrm>
-            <a:off x="6262919" y="8437528"/>
-            <a:ext cx="1707826" cy="923330"/>
-          </a:xfrm>
-          <a:prstGeom prst="rect">
-            <a:avLst/>
-          </a:prstGeom>
-        </p:spPr>
-        <p:txBody>
-          <a:bodyPr wrap="square">
-            <a:spAutoFit/>
-          </a:bodyPr>
-          <a:lstStyle/>
-          <a:p>
-            <a:pPr algn="ctr"/>
-            <a:r>
-              <a:rPr lang="en-US" dirty="0" err="1" smtClean="0">
-                <a:solidFill>
-                  <a:schemeClr val="tx1"/>
-                </a:solidFill>
-                <a:latin typeface="Comic Sans MS" panose="030F0702030302020204" pitchFamily="66" charset="0"/>
-              </a:rPr>
-              <a:t>Grrrr</a:t>
-            </a:r>
-            <a:endParaRPr lang="en-US" dirty="0" smtClean="0">
-              <a:solidFill>
-                <a:schemeClr val="tx1"/>
-              </a:solidFill>
-              <a:latin typeface="Comic Sans MS" panose="030F0702030302020204" pitchFamily="66" charset="0"/>
-            </a:endParaRPr>
-          </a:p>
-          <a:p>
-            <a:pPr algn="ctr"/>
-            <a:r>
-              <a:rPr lang="en-US" sz="1200" dirty="0" smtClean="0">
-                <a:latin typeface="Comic Sans MS" panose="030F0702030302020204" pitchFamily="66" charset="0"/>
-              </a:rPr>
-              <a:t>Derive data products based on model results</a:t>
-            </a:r>
-            <a:endParaRPr lang="en-US" sz="1200" dirty="0">
-              <a:latin typeface="Comic Sans MS" panose="030F0702030302020204" pitchFamily="66" charset="0"/>
-            </a:endParaRPr>
-          </a:p>
-        </p:txBody>
-      </p:sp>
-      <p:cxnSp>
-        <p:nvCxnSpPr>
-          <p:cNvPr id="51" name="Straight Arrow Connector 50"/>
-          <p:cNvCxnSpPr/>
-          <p:nvPr/>
-        </p:nvCxnSpPr>
-        <p:spPr>
-          <a:xfrm>
-            <a:off x="5783856" y="7160963"/>
-            <a:ext cx="598257" cy="881349"/>
-          </a:xfrm>
-          <a:prstGeom prst="straightConnector1">
-            <a:avLst/>
-          </a:prstGeom>
-          <a:ln w="57150">
-            <a:solidFill>
-              <a:schemeClr val="accent2"/>
-            </a:solidFill>
-            <a:tailEnd type="triangle"/>
-          </a:ln>
-        </p:spPr>
-        <p:style>
-          <a:lnRef idx="1">
-            <a:schemeClr val="accent1"/>
-          </a:lnRef>
-          <a:fillRef idx="0">
-            <a:schemeClr val="accent1"/>
-          </a:fillRef>
-          <a:effectRef idx="0">
-            <a:schemeClr val="accent1"/>
-          </a:effectRef>
-          <a:fontRef idx="minor">
-            <a:schemeClr val="tx1"/>
-          </a:fontRef>
-        </p:style>
-      </p:cxnSp>
-      <p:sp>
-        <p:nvSpPr>
-          <p:cNvPr id="52" name="Explosion 2 51"/>
-          <p:cNvSpPr/>
-          <p:nvPr/>
-        </p:nvSpPr>
-        <p:spPr>
-          <a:xfrm>
-            <a:off x="6641737" y="1637557"/>
-            <a:ext cx="3051607" cy="2694506"/>
-          </a:xfrm>
-          <a:prstGeom prst="irregularSeal2">
-            <a:avLst/>
-          </a:prstGeom>
-        </p:spPr>
-        <p:style>
-          <a:lnRef idx="1">
-            <a:schemeClr val="accent3"/>
-          </a:lnRef>
-          <a:fillRef idx="2">
-            <a:schemeClr val="accent3"/>
-          </a:fillRef>
-          <a:effectRef idx="1">
-            <a:schemeClr val="accent3"/>
-          </a:effectRef>
-          <a:fontRef idx="minor">
-            <a:schemeClr val="dk1"/>
-          </a:fontRef>
-        </p:style>
-        <p:txBody>
-          <a:bodyPr rtlCol="0" anchor="ctr"/>
-          <a:lstStyle/>
-          <a:p>
-            <a:pPr algn="ctr"/>
-            <a:endParaRPr lang="en-US" sz="1200" dirty="0">
-              <a:solidFill>
-                <a:schemeClr val="tx1"/>
-              </a:solidFill>
-              <a:latin typeface="Comic Sans MS" panose="030F0702030302020204" pitchFamily="66" charset="0"/>
-            </a:endParaRPr>
-          </a:p>
-        </p:txBody>
-      </p:sp>
-      <p:sp>
-        <p:nvSpPr>
-          <p:cNvPr id="53" name="TextBox 52"/>
-          <p:cNvSpPr txBox="1"/>
-          <p:nvPr/>
-        </p:nvSpPr>
-        <p:spPr>
-          <a:xfrm>
-            <a:off x="7105879" y="2984810"/>
-            <a:ext cx="1576175" cy="646331"/>
-          </a:xfrm>
-          <a:prstGeom prst="rect">
-            <a:avLst/>
-          </a:prstGeom>
-          <a:noFill/>
-        </p:spPr>
-        <p:txBody>
-          <a:bodyPr wrap="square" rtlCol="0">
-            <a:spAutoFit/>
-          </a:bodyPr>
-          <a:lstStyle/>
-          <a:p>
-            <a:pPr algn="ctr"/>
-            <a:r>
-              <a:rPr lang="en-US" sz="1200" dirty="0" smtClean="0">
-                <a:latin typeface="+mj-lt"/>
-              </a:rPr>
-              <a:t>Output: </a:t>
-            </a:r>
-            <a:r>
-              <a:rPr lang="en-US" sz="1200" dirty="0" smtClean="0">
-                <a:latin typeface="+mj-lt"/>
-              </a:rPr>
-              <a:t>series of </a:t>
-            </a:r>
-            <a:r>
-              <a:rPr lang="en-US" sz="1200" dirty="0" err="1" smtClean="0">
-                <a:latin typeface="+mj-lt"/>
-              </a:rPr>
-              <a:t>rasters</a:t>
-            </a:r>
-            <a:r>
-              <a:rPr lang="en-US" sz="1200" dirty="0" smtClean="0">
-                <a:latin typeface="+mj-lt"/>
-              </a:rPr>
-              <a:t> or tables with covariates per grid cell</a:t>
-            </a:r>
-            <a:endParaRPr lang="en-US" sz="1200" dirty="0">
-              <a:latin typeface="+mj-lt"/>
-            </a:endParaRPr>
-          </a:p>
-        </p:txBody>
-      </p:sp>
-      <p:sp>
-        <p:nvSpPr>
-          <p:cNvPr id="54" name="Rectangle 53"/>
-          <p:cNvSpPr/>
-          <p:nvPr/>
-        </p:nvSpPr>
-        <p:spPr>
-          <a:xfrm>
-            <a:off x="7442660" y="2138784"/>
-            <a:ext cx="1707826" cy="923330"/>
-          </a:xfrm>
-          <a:prstGeom prst="rect">
-            <a:avLst/>
-          </a:prstGeom>
-        </p:spPr>
-        <p:txBody>
-          <a:bodyPr wrap="square">
-            <a:spAutoFit/>
-          </a:bodyPr>
-          <a:lstStyle/>
-          <a:p>
-            <a:pPr algn="ctr"/>
-            <a:r>
-              <a:rPr lang="en-US" dirty="0" err="1" smtClean="0">
-                <a:solidFill>
-                  <a:schemeClr val="tx1"/>
-                </a:solidFill>
-                <a:latin typeface="Comic Sans MS" panose="030F0702030302020204" pitchFamily="66" charset="0"/>
-              </a:rPr>
-              <a:t>Fkrsh</a:t>
-            </a:r>
-            <a:endParaRPr lang="en-US" dirty="0" smtClean="0">
-              <a:solidFill>
-                <a:schemeClr val="tx1"/>
-              </a:solidFill>
-              <a:latin typeface="Comic Sans MS" panose="030F0702030302020204" pitchFamily="66" charset="0"/>
-            </a:endParaRPr>
-          </a:p>
-          <a:p>
-            <a:pPr algn="ctr"/>
-            <a:r>
-              <a:rPr lang="en-US" sz="1200" dirty="0" smtClean="0">
-                <a:latin typeface="Comic Sans MS" panose="030F0702030302020204" pitchFamily="66" charset="0"/>
-              </a:rPr>
-              <a:t>Extract covariates to produce prediction grids</a:t>
+              <a:t>covariates to produce prediction grids</a:t>
             </a:r>
             <a:endParaRPr lang="en-US" sz="1200" dirty="0">
               <a:latin typeface="Comic Sans MS" panose="030F0702030302020204" pitchFamily="66" charset="0"/>
@@ -4802,8 +4146,8 @@
         </p:nvCxnSpPr>
         <p:spPr>
           <a:xfrm flipH="1">
-            <a:off x="7164120" y="4240080"/>
-            <a:ext cx="686957" cy="3694096"/>
+            <a:off x="5387248" y="2959886"/>
+            <a:ext cx="459618" cy="2050679"/>
           </a:xfrm>
           <a:prstGeom prst="straightConnector1">
             <a:avLst/>
@@ -4843,6 +4187,777 @@
 </p:sld>
 </file>
 
+<file path=ppt/slides/slide2.xml><?xml version="1.0" encoding="utf-8"?>
+<p:sld xmlns:a="http://schemas.openxmlformats.org/drawingml/2006/main" xmlns:r="http://schemas.openxmlformats.org/officeDocument/2006/relationships" xmlns:p="http://schemas.openxmlformats.org/presentationml/2006/main">
+  <p:cSld>
+    <p:spTree>
+      <p:nvGrpSpPr>
+        <p:cNvPr id="1" name=""/>
+        <p:cNvGrpSpPr/>
+        <p:nvPr/>
+      </p:nvGrpSpPr>
+      <p:grpSpPr>
+        <a:xfrm>
+          <a:off x="0" y="0"/>
+          <a:ext cx="0" cy="0"/>
+          <a:chOff x="0" y="0"/>
+          <a:chExt cx="0" cy="0"/>
+        </a:xfrm>
+      </p:grpSpPr>
+      <p:sp>
+        <p:nvSpPr>
+          <p:cNvPr id="6" name="Rounded Rectangle 5"/>
+          <p:cNvSpPr/>
+          <p:nvPr/>
+        </p:nvSpPr>
+        <p:spPr>
+          <a:xfrm>
+            <a:off x="314325" y="1497841"/>
+            <a:ext cx="6543675" cy="3267835"/>
+          </a:xfrm>
+          <a:prstGeom prst="roundRect">
+            <a:avLst>
+              <a:gd name="adj" fmla="val 4206"/>
+            </a:avLst>
+          </a:prstGeom>
+        </p:spPr>
+        <p:style>
+          <a:lnRef idx="3">
+            <a:schemeClr val="lt1"/>
+          </a:lnRef>
+          <a:fillRef idx="1">
+            <a:schemeClr val="accent3"/>
+          </a:fillRef>
+          <a:effectRef idx="1">
+            <a:schemeClr val="accent3"/>
+          </a:effectRef>
+          <a:fontRef idx="minor">
+            <a:schemeClr val="lt1"/>
+          </a:fontRef>
+        </p:style>
+        <p:txBody>
+          <a:bodyPr rtlCol="0" anchor="t" anchorCtr="0"/>
+          <a:lstStyle/>
+          <a:p>
+            <a:pPr algn="ctr"/>
+            <a:r>
+              <a:rPr lang="en-US" dirty="0" smtClean="0">
+                <a:solidFill>
+                  <a:schemeClr val="tx1"/>
+                </a:solidFill>
+              </a:rPr>
+              <a:t>Necessary Input</a:t>
+            </a:r>
+            <a:endParaRPr lang="en-US" dirty="0">
+              <a:solidFill>
+                <a:schemeClr val="tx1"/>
+              </a:solidFill>
+            </a:endParaRPr>
+          </a:p>
+        </p:txBody>
+      </p:sp>
+      <p:sp>
+        <p:nvSpPr>
+          <p:cNvPr id="8" name="Rounded Rectangle 7"/>
+          <p:cNvSpPr/>
+          <p:nvPr/>
+        </p:nvSpPr>
+        <p:spPr>
+          <a:xfrm>
+            <a:off x="314325" y="4964942"/>
+            <a:ext cx="6543675" cy="4843427"/>
+          </a:xfrm>
+          <a:prstGeom prst="roundRect">
+            <a:avLst>
+              <a:gd name="adj" fmla="val 4206"/>
+            </a:avLst>
+          </a:prstGeom>
+        </p:spPr>
+        <p:style>
+          <a:lnRef idx="3">
+            <a:schemeClr val="lt1"/>
+          </a:lnRef>
+          <a:fillRef idx="1">
+            <a:schemeClr val="accent3"/>
+          </a:fillRef>
+          <a:effectRef idx="1">
+            <a:schemeClr val="accent3"/>
+          </a:effectRef>
+          <a:fontRef idx="minor">
+            <a:schemeClr val="lt1"/>
+          </a:fontRef>
+        </p:style>
+        <p:txBody>
+          <a:bodyPr rtlCol="0" anchor="t" anchorCtr="0"/>
+          <a:lstStyle/>
+          <a:p>
+            <a:pPr algn="ctr"/>
+            <a:r>
+              <a:rPr lang="en-US" dirty="0" smtClean="0">
+                <a:solidFill>
+                  <a:schemeClr val="tx1"/>
+                </a:solidFill>
+              </a:rPr>
+              <a:t>Fields Produced in Output</a:t>
+            </a:r>
+            <a:endParaRPr lang="en-US" dirty="0">
+              <a:solidFill>
+                <a:schemeClr val="tx1"/>
+              </a:solidFill>
+            </a:endParaRPr>
+          </a:p>
+        </p:txBody>
+      </p:sp>
+      <p:sp>
+        <p:nvSpPr>
+          <p:cNvPr id="2" name="Explosion 2 1"/>
+          <p:cNvSpPr/>
+          <p:nvPr/>
+        </p:nvSpPr>
+        <p:spPr>
+          <a:xfrm>
+            <a:off x="-437869" y="-50006"/>
+            <a:ext cx="3051607" cy="2694506"/>
+          </a:xfrm>
+          <a:prstGeom prst="irregularSeal2">
+            <a:avLst/>
+          </a:prstGeom>
+        </p:spPr>
+        <p:style>
+          <a:lnRef idx="1">
+            <a:schemeClr val="accent3"/>
+          </a:lnRef>
+          <a:fillRef idx="2">
+            <a:schemeClr val="accent3"/>
+          </a:fillRef>
+          <a:effectRef idx="1">
+            <a:schemeClr val="accent3"/>
+          </a:effectRef>
+          <a:fontRef idx="minor">
+            <a:schemeClr val="dk1"/>
+          </a:fontRef>
+        </p:style>
+        <p:txBody>
+          <a:bodyPr rtlCol="0" anchor="ctr"/>
+          <a:lstStyle/>
+          <a:p>
+            <a:pPr algn="ctr"/>
+            <a:endParaRPr lang="en-US" sz="1200" dirty="0">
+              <a:solidFill>
+                <a:schemeClr val="tx1"/>
+              </a:solidFill>
+              <a:latin typeface="Comic Sans MS" panose="030F0702030302020204" pitchFamily="66" charset="0"/>
+            </a:endParaRPr>
+          </a:p>
+        </p:txBody>
+      </p:sp>
+      <p:sp>
+        <p:nvSpPr>
+          <p:cNvPr id="3" name="TextBox 2"/>
+          <p:cNvSpPr txBox="1"/>
+          <p:nvPr/>
+        </p:nvSpPr>
+        <p:spPr>
+          <a:xfrm>
+            <a:off x="-41892" y="1497841"/>
+            <a:ext cx="1848519" cy="276999"/>
+          </a:xfrm>
+          <a:prstGeom prst="rect">
+            <a:avLst/>
+          </a:prstGeom>
+          <a:noFill/>
+        </p:spPr>
+        <p:txBody>
+          <a:bodyPr wrap="none" rtlCol="0">
+            <a:spAutoFit/>
+          </a:bodyPr>
+          <a:lstStyle/>
+          <a:p>
+            <a:r>
+              <a:rPr lang="en-US" sz="1200" dirty="0" smtClean="0">
+                <a:latin typeface="+mj-lt"/>
+              </a:rPr>
+              <a:t>Output: long format tables</a:t>
+            </a:r>
+            <a:endParaRPr lang="en-US" sz="1200" dirty="0">
+              <a:latin typeface="+mj-lt"/>
+            </a:endParaRPr>
+          </a:p>
+        </p:txBody>
+      </p:sp>
+      <p:sp>
+        <p:nvSpPr>
+          <p:cNvPr id="4" name="Rectangle 3"/>
+          <p:cNvSpPr/>
+          <p:nvPr/>
+        </p:nvSpPr>
+        <p:spPr>
+          <a:xfrm>
+            <a:off x="-41892" y="735055"/>
+            <a:ext cx="2077562" cy="738664"/>
+          </a:xfrm>
+          <a:prstGeom prst="rect">
+            <a:avLst/>
+          </a:prstGeom>
+        </p:spPr>
+        <p:txBody>
+          <a:bodyPr wrap="square">
+            <a:spAutoFit/>
+          </a:bodyPr>
+          <a:lstStyle/>
+          <a:p>
+            <a:pPr algn="ctr"/>
+            <a:r>
+              <a:rPr lang="en-US" dirty="0" smtClean="0">
+                <a:solidFill>
+                  <a:schemeClr val="tx1"/>
+                </a:solidFill>
+                <a:latin typeface="Comic Sans MS" panose="030F0702030302020204" pitchFamily="66" charset="0"/>
+              </a:rPr>
+              <a:t>Aargh</a:t>
+            </a:r>
+          </a:p>
+          <a:p>
+            <a:pPr algn="ctr"/>
+            <a:r>
+              <a:rPr lang="en-US" sz="1200" dirty="0">
+                <a:latin typeface="Comic Sans MS" panose="030F0702030302020204" pitchFamily="66" charset="0"/>
+              </a:rPr>
+              <a:t>Data acquisition, quality-checking, and clean up</a:t>
+            </a:r>
+          </a:p>
+        </p:txBody>
+      </p:sp>
+      <p:sp>
+        <p:nvSpPr>
+          <p:cNvPr id="11" name="Rectangle 10"/>
+          <p:cNvSpPr/>
+          <p:nvPr/>
+        </p:nvSpPr>
+        <p:spPr>
+          <a:xfrm>
+            <a:off x="442913" y="5383568"/>
+            <a:ext cx="6300787" cy="4303357"/>
+          </a:xfrm>
+          <a:prstGeom prst="rect">
+            <a:avLst/>
+          </a:prstGeom>
+          <a:solidFill>
+            <a:schemeClr val="bg1"/>
+          </a:solidFill>
+          <a:ln>
+            <a:noFill/>
+          </a:ln>
+        </p:spPr>
+        <p:style>
+          <a:lnRef idx="2">
+            <a:schemeClr val="accent1">
+              <a:shade val="50000"/>
+            </a:schemeClr>
+          </a:lnRef>
+          <a:fillRef idx="1">
+            <a:schemeClr val="accent1"/>
+          </a:fillRef>
+          <a:effectRef idx="0">
+            <a:schemeClr val="accent1"/>
+          </a:effectRef>
+          <a:fontRef idx="minor">
+            <a:schemeClr val="lt1"/>
+          </a:fontRef>
+        </p:style>
+        <p:txBody>
+          <a:bodyPr rtlCol="0" anchor="t" anchorCtr="0"/>
+          <a:lstStyle/>
+          <a:p>
+            <a:pPr algn="ctr"/>
+            <a:r>
+              <a:rPr lang="en-US" b="1" dirty="0" smtClean="0">
+                <a:solidFill>
+                  <a:schemeClr val="tx1"/>
+                </a:solidFill>
+              </a:rPr>
+              <a:t>Fields needed to calculate offsets:</a:t>
+            </a:r>
+            <a:endParaRPr lang="en-US" b="1" dirty="0">
+              <a:solidFill>
+                <a:schemeClr val="tx1"/>
+              </a:solidFill>
+            </a:endParaRPr>
+          </a:p>
+          <a:p>
+            <a:r>
+              <a:rPr lang="en-US" sz="1600" b="1" dirty="0" smtClean="0">
+                <a:solidFill>
+                  <a:schemeClr val="tx1"/>
+                </a:solidFill>
+              </a:rPr>
+              <a:t>Singing rate (time removal) component</a:t>
+            </a:r>
+          </a:p>
+          <a:p>
+            <a:r>
+              <a:rPr lang="en-US" sz="1600" dirty="0" smtClean="0">
+                <a:solidFill>
+                  <a:schemeClr val="tx1"/>
+                </a:solidFill>
+              </a:rPr>
+              <a:t>JDAY</a:t>
+            </a:r>
+            <a:r>
+              <a:rPr lang="en-US" sz="1600" dirty="0">
+                <a:solidFill>
+                  <a:schemeClr val="tx1"/>
+                </a:solidFill>
+              </a:rPr>
+              <a:t>: Julian day / 365</a:t>
+            </a:r>
+          </a:p>
+          <a:p>
+            <a:r>
+              <a:rPr lang="en-US" sz="1600" dirty="0">
+                <a:solidFill>
+                  <a:schemeClr val="tx1"/>
+                </a:solidFill>
+              </a:rPr>
+              <a:t>JDAY2: JDAY</a:t>
+            </a:r>
+            <a:r>
+              <a:rPr lang="en-US" sz="1600" baseline="30000" dirty="0">
+                <a:solidFill>
+                  <a:schemeClr val="tx1"/>
+                </a:solidFill>
+              </a:rPr>
+              <a:t>2</a:t>
+            </a:r>
+          </a:p>
+          <a:p>
+            <a:r>
+              <a:rPr lang="en-US" sz="1600" dirty="0" smtClean="0">
+                <a:solidFill>
+                  <a:schemeClr val="tx1"/>
+                </a:solidFill>
+              </a:rPr>
+              <a:t>TSSR: time since sunrise (requires time zone)</a:t>
+            </a:r>
+          </a:p>
+          <a:p>
+            <a:r>
+              <a:rPr lang="en-US" sz="1600" dirty="0">
+                <a:solidFill>
+                  <a:schemeClr val="tx1"/>
+                </a:solidFill>
+              </a:rPr>
+              <a:t>TSSR2: TSSR</a:t>
+            </a:r>
+            <a:r>
+              <a:rPr lang="en-US" sz="1600" baseline="30000" dirty="0">
+                <a:solidFill>
+                  <a:schemeClr val="tx1"/>
+                </a:solidFill>
+              </a:rPr>
+              <a:t>2</a:t>
+            </a:r>
+            <a:endParaRPr lang="en-US" sz="1600" dirty="0">
+              <a:solidFill>
+                <a:schemeClr val="tx1"/>
+              </a:solidFill>
+            </a:endParaRPr>
+          </a:p>
+          <a:p>
+            <a:r>
+              <a:rPr lang="en-US" sz="1600" dirty="0" smtClean="0">
+                <a:solidFill>
+                  <a:schemeClr val="tx1"/>
+                </a:solidFill>
+              </a:rPr>
+              <a:t>DSLS: days since local spring. </a:t>
+            </a:r>
+            <a:r>
+              <a:rPr lang="en-US" sz="1600" u="sng" dirty="0" smtClean="0">
+                <a:solidFill>
+                  <a:schemeClr val="tx1"/>
+                </a:solidFill>
+              </a:rPr>
+              <a:t>(Julian date – day of first spring)</a:t>
+            </a:r>
+            <a:r>
+              <a:rPr lang="en-US" sz="1600" dirty="0" smtClean="0">
+                <a:solidFill>
+                  <a:schemeClr val="tx1"/>
+                </a:solidFill>
+              </a:rPr>
+              <a:t>  									     365</a:t>
+            </a:r>
+          </a:p>
+          <a:p>
+            <a:r>
+              <a:rPr lang="en-US" sz="1600" dirty="0">
+                <a:solidFill>
+                  <a:schemeClr val="tx1"/>
+                </a:solidFill>
+              </a:rPr>
+              <a:t>DSLS2: </a:t>
+            </a:r>
+            <a:r>
+              <a:rPr lang="en-US" sz="1600" dirty="0" smtClean="0">
+                <a:solidFill>
+                  <a:schemeClr val="tx1"/>
+                </a:solidFill>
+              </a:rPr>
+              <a:t>DSLS</a:t>
+            </a:r>
+            <a:r>
+              <a:rPr lang="en-US" sz="1600" baseline="30000" dirty="0" smtClean="0">
+                <a:solidFill>
+                  <a:schemeClr val="tx1"/>
+                </a:solidFill>
+              </a:rPr>
+              <a:t>2</a:t>
+            </a:r>
+          </a:p>
+          <a:p>
+            <a:endParaRPr lang="en-US" sz="1600" b="1" dirty="0" smtClean="0">
+              <a:solidFill>
+                <a:schemeClr val="tx1"/>
+              </a:solidFill>
+            </a:endParaRPr>
+          </a:p>
+          <a:p>
+            <a:r>
+              <a:rPr lang="en-US" sz="1600" b="1" dirty="0" smtClean="0">
+                <a:solidFill>
+                  <a:schemeClr val="tx1"/>
+                </a:solidFill>
+              </a:rPr>
+              <a:t>Effective Detection Radius (distance sampling) component</a:t>
+            </a:r>
+            <a:endParaRPr lang="en-US" sz="1600" b="1" dirty="0">
+              <a:solidFill>
+                <a:schemeClr val="tx1"/>
+              </a:solidFill>
+            </a:endParaRPr>
+          </a:p>
+          <a:p>
+            <a:r>
+              <a:rPr lang="en-US" sz="1600" dirty="0" smtClean="0">
+                <a:solidFill>
+                  <a:schemeClr val="tx1"/>
+                </a:solidFill>
+              </a:rPr>
+              <a:t>TREE: percent tree cover</a:t>
+            </a:r>
+          </a:p>
+          <a:p>
+            <a:r>
+              <a:rPr lang="en-US" sz="1600" dirty="0" smtClean="0">
+                <a:solidFill>
+                  <a:schemeClr val="tx1"/>
+                </a:solidFill>
+              </a:rPr>
+              <a:t>LCC2OpenWet: Indicator variable - if habitat is open or wet (from LCC2)</a:t>
+            </a:r>
+          </a:p>
+          <a:p>
+            <a:r>
+              <a:rPr lang="en-US" sz="1600" dirty="0" smtClean="0">
+                <a:solidFill>
+                  <a:schemeClr val="tx1"/>
+                </a:solidFill>
+              </a:rPr>
+              <a:t>LCC4Conif: Indicator variable – if habitat is coniferous (from LCC4)</a:t>
+            </a:r>
+          </a:p>
+          <a:p>
+            <a:r>
+              <a:rPr lang="en-US" sz="1600" dirty="0" smtClean="0">
+                <a:solidFill>
+                  <a:schemeClr val="tx1"/>
+                </a:solidFill>
+              </a:rPr>
+              <a:t>LCC4Open: Indicator variable – if habitat is open</a:t>
+            </a:r>
+            <a:r>
+              <a:rPr lang="en-US" sz="1600" dirty="0">
+                <a:solidFill>
+                  <a:schemeClr val="tx1"/>
+                </a:solidFill>
+              </a:rPr>
+              <a:t> (from LCC4)</a:t>
+            </a:r>
+            <a:endParaRPr lang="en-US" sz="1600" dirty="0" smtClean="0">
+              <a:solidFill>
+                <a:schemeClr val="tx1"/>
+              </a:solidFill>
+            </a:endParaRPr>
+          </a:p>
+          <a:p>
+            <a:r>
+              <a:rPr lang="en-US" sz="1600" dirty="0" smtClean="0">
+                <a:solidFill>
+                  <a:schemeClr val="tx1"/>
+                </a:solidFill>
+              </a:rPr>
+              <a:t>LCC4Wet: Indicator variable – if habitat is wet</a:t>
+            </a:r>
+            <a:r>
+              <a:rPr lang="en-US" sz="1600" dirty="0">
+                <a:solidFill>
+                  <a:schemeClr val="tx1"/>
+                </a:solidFill>
+              </a:rPr>
+              <a:t> (from LCC4)</a:t>
+            </a:r>
+            <a:endParaRPr lang="en-US" sz="1600" dirty="0" smtClean="0">
+              <a:solidFill>
+                <a:schemeClr val="tx1"/>
+              </a:solidFill>
+            </a:endParaRPr>
+          </a:p>
+          <a:p>
+            <a:r>
+              <a:rPr lang="en-US" sz="1600" dirty="0" smtClean="0">
+                <a:solidFill>
+                  <a:schemeClr val="tx1"/>
+                </a:solidFill>
+              </a:rPr>
+              <a:t>MAXDIS: maximum distance band for point count, divided by 100</a:t>
+            </a:r>
+          </a:p>
+        </p:txBody>
+      </p:sp>
+      <p:sp>
+        <p:nvSpPr>
+          <p:cNvPr id="12" name="Rectangle 11"/>
+          <p:cNvSpPr/>
+          <p:nvPr/>
+        </p:nvSpPr>
+        <p:spPr>
+          <a:xfrm>
+            <a:off x="435768" y="1892346"/>
+            <a:ext cx="6300787" cy="2779668"/>
+          </a:xfrm>
+          <a:prstGeom prst="rect">
+            <a:avLst/>
+          </a:prstGeom>
+          <a:solidFill>
+            <a:schemeClr val="bg1"/>
+          </a:solidFill>
+          <a:ln>
+            <a:noFill/>
+          </a:ln>
+        </p:spPr>
+        <p:style>
+          <a:lnRef idx="2">
+            <a:schemeClr val="accent1">
+              <a:shade val="50000"/>
+            </a:schemeClr>
+          </a:lnRef>
+          <a:fillRef idx="1">
+            <a:schemeClr val="accent1"/>
+          </a:fillRef>
+          <a:effectRef idx="0">
+            <a:schemeClr val="accent1"/>
+          </a:effectRef>
+          <a:fontRef idx="minor">
+            <a:schemeClr val="lt1"/>
+          </a:fontRef>
+        </p:style>
+        <p:txBody>
+          <a:bodyPr rtlCol="0" anchor="t" anchorCtr="0"/>
+          <a:lstStyle/>
+          <a:p>
+            <a:pPr algn="ctr"/>
+            <a:r>
+              <a:rPr lang="en-US" b="1" dirty="0" smtClean="0">
+                <a:solidFill>
+                  <a:schemeClr val="tx1"/>
+                </a:solidFill>
+              </a:rPr>
+              <a:t>Fields needed to calculate offsets:</a:t>
+            </a:r>
+            <a:endParaRPr lang="en-US" b="1" dirty="0">
+              <a:solidFill>
+                <a:schemeClr val="tx1"/>
+              </a:solidFill>
+            </a:endParaRPr>
+          </a:p>
+          <a:p>
+            <a:r>
+              <a:rPr lang="en-US" sz="1600" dirty="0" smtClean="0">
+                <a:solidFill>
+                  <a:schemeClr val="tx1"/>
+                </a:solidFill>
+              </a:rPr>
+              <a:t>JULIAN: Julian day (extracted as </a:t>
+            </a:r>
+            <a:r>
+              <a:rPr lang="en-US" sz="1600" dirty="0" err="1" smtClean="0">
+                <a:solidFill>
+                  <a:schemeClr val="tx1"/>
+                </a:solidFill>
+              </a:rPr>
+              <a:t>yday</a:t>
+            </a:r>
+            <a:r>
+              <a:rPr lang="en-US" sz="1600" dirty="0" smtClean="0">
+                <a:solidFill>
+                  <a:schemeClr val="tx1"/>
+                </a:solidFill>
+              </a:rPr>
+              <a:t> from </a:t>
+            </a:r>
+            <a:r>
+              <a:rPr lang="en-US" sz="1600" smtClean="0">
+                <a:solidFill>
+                  <a:schemeClr val="tx1"/>
+                </a:solidFill>
+              </a:rPr>
+              <a:t>POSIXct</a:t>
+            </a:r>
+            <a:endParaRPr lang="en-US" sz="1600" dirty="0">
+              <a:solidFill>
+                <a:schemeClr val="tx1"/>
+              </a:solidFill>
+            </a:endParaRPr>
+          </a:p>
+          <a:p>
+            <a:r>
+              <a:rPr lang="en-US" sz="1600" dirty="0">
+                <a:solidFill>
+                  <a:schemeClr val="tx1"/>
+                </a:solidFill>
+              </a:rPr>
+              <a:t>JDAY2: </a:t>
+            </a:r>
+            <a:r>
+              <a:rPr lang="en-US" sz="1600" dirty="0" smtClean="0">
+                <a:solidFill>
+                  <a:schemeClr val="tx1"/>
+                </a:solidFill>
+              </a:rPr>
+              <a:t>JDAY</a:t>
+            </a:r>
+            <a:r>
+              <a:rPr lang="en-US" sz="1600" baseline="30000" dirty="0" smtClean="0">
+                <a:solidFill>
+                  <a:schemeClr val="tx1"/>
+                </a:solidFill>
+              </a:rPr>
+              <a:t>2</a:t>
+            </a:r>
+            <a:endParaRPr lang="en-US" sz="1600" baseline="30000" dirty="0">
+              <a:solidFill>
+                <a:schemeClr val="tx1"/>
+              </a:solidFill>
+            </a:endParaRPr>
+          </a:p>
+          <a:p>
+            <a:r>
+              <a:rPr lang="en-US" sz="1600" dirty="0" smtClean="0">
+                <a:solidFill>
+                  <a:schemeClr val="tx1"/>
+                </a:solidFill>
+              </a:rPr>
+              <a:t>TSSR: time since sunrise (requires time zone)</a:t>
+            </a:r>
+          </a:p>
+          <a:p>
+            <a:r>
+              <a:rPr lang="en-US" sz="1600" dirty="0">
+                <a:solidFill>
+                  <a:schemeClr val="tx1"/>
+                </a:solidFill>
+              </a:rPr>
+              <a:t>TSSR2: TSSR</a:t>
+            </a:r>
+            <a:r>
+              <a:rPr lang="en-US" sz="1600" baseline="30000" dirty="0">
+                <a:solidFill>
+                  <a:schemeClr val="tx1"/>
+                </a:solidFill>
+              </a:rPr>
+              <a:t>2</a:t>
+            </a:r>
+            <a:endParaRPr lang="en-US" sz="1600" dirty="0">
+              <a:solidFill>
+                <a:schemeClr val="tx1"/>
+              </a:solidFill>
+            </a:endParaRPr>
+          </a:p>
+          <a:p>
+            <a:r>
+              <a:rPr lang="en-US" sz="1600" dirty="0" smtClean="0">
+                <a:solidFill>
+                  <a:schemeClr val="tx1"/>
+                </a:solidFill>
+              </a:rPr>
+              <a:t>DSLS: days since local spring. </a:t>
+            </a:r>
+            <a:r>
+              <a:rPr lang="en-US" sz="1600" u="sng" dirty="0" smtClean="0">
+                <a:solidFill>
+                  <a:schemeClr val="tx1"/>
+                </a:solidFill>
+              </a:rPr>
+              <a:t>(Julian date – day of first spring)</a:t>
+            </a:r>
+            <a:r>
+              <a:rPr lang="en-US" sz="1600" dirty="0" smtClean="0">
+                <a:solidFill>
+                  <a:schemeClr val="tx1"/>
+                </a:solidFill>
+              </a:rPr>
+              <a:t>  									     365</a:t>
+            </a:r>
+          </a:p>
+          <a:p>
+            <a:r>
+              <a:rPr lang="en-US" sz="1600" dirty="0">
+                <a:solidFill>
+                  <a:schemeClr val="tx1"/>
+                </a:solidFill>
+              </a:rPr>
+              <a:t>DSLS2: </a:t>
+            </a:r>
+            <a:r>
+              <a:rPr lang="en-US" sz="1600" dirty="0" smtClean="0">
+                <a:solidFill>
+                  <a:schemeClr val="tx1"/>
+                </a:solidFill>
+              </a:rPr>
+              <a:t>DSLS</a:t>
+            </a:r>
+            <a:r>
+              <a:rPr lang="en-US" sz="1600" baseline="30000" dirty="0" smtClean="0">
+                <a:solidFill>
+                  <a:schemeClr val="tx1"/>
+                </a:solidFill>
+              </a:rPr>
+              <a:t>2</a:t>
+            </a:r>
+          </a:p>
+          <a:p>
+            <a:endParaRPr lang="en-US" sz="1600" b="1" dirty="0" smtClean="0">
+              <a:solidFill>
+                <a:schemeClr val="tx1"/>
+              </a:solidFill>
+            </a:endParaRPr>
+          </a:p>
+        </p:txBody>
+      </p:sp>
+    </p:spTree>
+    <p:extLst>
+      <p:ext uri="{BB962C8B-B14F-4D97-AF65-F5344CB8AC3E}">
+        <p14:creationId xmlns:p14="http://schemas.microsoft.com/office/powerpoint/2010/main" val="1724498266"/>
+      </p:ext>
+    </p:extLst>
+  </p:cSld>
+  <p:clrMapOvr>
+    <a:masterClrMapping/>
+  </p:clrMapOvr>
+</p:sld>
+</file>
+
 <file path=ppt/slides/slide3.xml><?xml version="1.0" encoding="utf-8"?>
 <p:sld xmlns:a="http://schemas.openxmlformats.org/drawingml/2006/main" xmlns:r="http://schemas.openxmlformats.org/officeDocument/2006/relationships" xmlns:p="http://schemas.openxmlformats.org/presentationml/2006/main">
   <p:cSld>
@@ -4868,8 +4983,8 @@
         </p:nvSpPr>
         <p:spPr>
           <a:xfrm>
-            <a:off x="314325" y="1497841"/>
-            <a:ext cx="6543675" cy="3267835"/>
+            <a:off x="314325" y="1497840"/>
+            <a:ext cx="6543675" cy="5195853"/>
           </a:xfrm>
           <a:prstGeom prst="roundRect">
             <a:avLst>
@@ -4920,8 +5035,8 @@
         </p:nvSpPr>
         <p:spPr>
           <a:xfrm>
-            <a:off x="314325" y="4964942"/>
-            <a:ext cx="6543675" cy="4843427"/>
+            <a:off x="442913" y="7308092"/>
+            <a:ext cx="6543675" cy="3267835"/>
           </a:xfrm>
           <a:prstGeom prst="roundRect">
             <a:avLst>
@@ -4954,23 +5069,7 @@
                   <a:schemeClr val="tx1"/>
                 </a:solidFill>
               </a:rPr>
-              <a:t>Fields </a:t>
-            </a:r>
-            <a:r>
-              <a:rPr lang="en-US" dirty="0" smtClean="0">
-                <a:solidFill>
-                  <a:schemeClr val="tx1"/>
-                </a:solidFill>
-              </a:rPr>
-              <a:t>Produced </a:t>
-            </a:r>
-            <a:r>
-              <a:rPr lang="en-US" dirty="0" smtClean="0">
-                <a:solidFill>
-                  <a:schemeClr val="tx1"/>
-                </a:solidFill>
-              </a:rPr>
-              <a:t>in Output</a:t>
+              <a:t>Fields Required in Output</a:t>
             </a:r>
             <a:endParaRPr lang="en-US" dirty="0">
               <a:solidFill>
@@ -4982,134 +5081,14 @@
       </p:sp>
       <p:sp>
         <p:nvSpPr>
-          <p:cNvPr id="2" name="Explosion 2 1"/>
+          <p:cNvPr id="9" name="Rectangle 8"/>
           <p:cNvSpPr/>
           <p:nvPr/>
         </p:nvSpPr>
         <p:spPr>
           <a:xfrm>
-            <a:off x="-437869" y="-50006"/>
-            <a:ext cx="3051607" cy="2694506"/>
-          </a:xfrm>
-          <a:prstGeom prst="irregularSeal2">
-            <a:avLst/>
-          </a:prstGeom>
-        </p:spPr>
-        <p:style>
-          <a:lnRef idx="1">
-            <a:schemeClr val="accent3"/>
-          </a:lnRef>
-          <a:fillRef idx="2">
-            <a:schemeClr val="accent3"/>
-          </a:fillRef>
-          <a:effectRef idx="1">
-            <a:schemeClr val="accent3"/>
-          </a:effectRef>
-          <a:fontRef idx="minor">
-            <a:schemeClr val="dk1"/>
-          </a:fontRef>
-        </p:style>
-        <p:txBody>
-          <a:bodyPr rtlCol="0" anchor="ctr"/>
-          <a:lstStyle/>
-          <a:p>
-            <a:pPr algn="ctr"/>
-            <a:endParaRPr lang="en-US" sz="1200" dirty="0">
-              <a:solidFill>
-                <a:schemeClr val="tx1"/>
-              </a:solidFill>
-              <a:latin typeface="Comic Sans MS" panose="030F0702030302020204" pitchFamily="66" charset="0"/>
-            </a:endParaRPr>
-          </a:p>
-        </p:txBody>
-      </p:sp>
-      <p:sp>
-        <p:nvSpPr>
-          <p:cNvPr id="3" name="TextBox 2"/>
-          <p:cNvSpPr txBox="1"/>
-          <p:nvPr/>
-        </p:nvSpPr>
-        <p:spPr>
-          <a:xfrm>
-            <a:off x="-41892" y="1497841"/>
-            <a:ext cx="1848519" cy="276999"/>
-          </a:xfrm>
-          <a:prstGeom prst="rect">
-            <a:avLst/>
-          </a:prstGeom>
-          <a:noFill/>
-        </p:spPr>
-        <p:txBody>
-          <a:bodyPr wrap="none" rtlCol="0">
-            <a:spAutoFit/>
-          </a:bodyPr>
-          <a:lstStyle/>
-          <a:p>
-            <a:r>
-              <a:rPr lang="en-US" sz="1200" dirty="0" smtClean="0">
-                <a:latin typeface="+mj-lt"/>
-              </a:rPr>
-              <a:t>Output: long format tables</a:t>
-            </a:r>
-            <a:endParaRPr lang="en-US" sz="1200" dirty="0">
-              <a:latin typeface="+mj-lt"/>
-            </a:endParaRPr>
-          </a:p>
-        </p:txBody>
-      </p:sp>
-      <p:sp>
-        <p:nvSpPr>
-          <p:cNvPr id="4" name="Rectangle 3"/>
-          <p:cNvSpPr/>
-          <p:nvPr/>
-        </p:nvSpPr>
-        <p:spPr>
-          <a:xfrm>
-            <a:off x="-41892" y="735055"/>
-            <a:ext cx="2077562" cy="738664"/>
-          </a:xfrm>
-          <a:prstGeom prst="rect">
-            <a:avLst/>
-          </a:prstGeom>
-        </p:spPr>
-        <p:txBody>
-          <a:bodyPr wrap="square">
-            <a:spAutoFit/>
-          </a:bodyPr>
-          <a:lstStyle/>
-          <a:p>
-            <a:pPr algn="ctr"/>
-            <a:r>
-              <a:rPr lang="en-US" dirty="0" smtClean="0">
-                <a:solidFill>
-                  <a:schemeClr val="tx1"/>
-                </a:solidFill>
-                <a:latin typeface="Comic Sans MS" panose="030F0702030302020204" pitchFamily="66" charset="0"/>
-              </a:rPr>
-              <a:t>Aargh</a:t>
-            </a:r>
-          </a:p>
-          <a:p>
-            <a:pPr algn="ctr"/>
-            <a:r>
-              <a:rPr lang="en-US" sz="1200" dirty="0">
-                <a:latin typeface="Comic Sans MS" panose="030F0702030302020204" pitchFamily="66" charset="0"/>
-              </a:rPr>
-              <a:t>Data acquisition, quality-checking, and clean up</a:t>
-            </a:r>
-          </a:p>
-        </p:txBody>
-      </p:sp>
-      <p:sp>
-        <p:nvSpPr>
-          <p:cNvPr id="11" name="Rectangle 10"/>
-          <p:cNvSpPr/>
-          <p:nvPr/>
-        </p:nvSpPr>
-        <p:spPr>
-          <a:xfrm>
-            <a:off x="442913" y="5383568"/>
-            <a:ext cx="6300787" cy="4303357"/>
+            <a:off x="442913" y="1983143"/>
+            <a:ext cx="6300787" cy="4517670"/>
           </a:xfrm>
           <a:prstGeom prst="rect">
             <a:avLst/>
@@ -5209,17 +5188,25 @@
                   <a:schemeClr val="tx1"/>
                 </a:solidFill>
               </a:rPr>
-              <a:t>TSSR: time since sunrise (requires time zone)</a:t>
-            </a:r>
-          </a:p>
-          <a:p>
+              <a:t>TSSR: time since sunrise </a:t>
+            </a:r>
+          </a:p>
+          <a:p>
+            <a:r>
+              <a:rPr lang="en-US" sz="1600" dirty="0" smtClean="0">
+                <a:solidFill>
+                  <a:schemeClr val="tx1"/>
+                </a:solidFill>
+              </a:rPr>
+              <a:t>TSSR2</a:t>
+            </a:r>
             <a:r>
               <a:rPr lang="en-US" sz="1600" dirty="0">
                 <a:solidFill>
                   <a:schemeClr val="tx1"/>
                 </a:solidFill>
               </a:rPr>
-              <a:t>TSSR2: TSSR</a:t>
+              <a:t>: TSSR</a:t>
             </a:r>
             <a:r>
               <a:rPr lang="en-US" sz="1600" baseline="30000" dirty="0">
@@ -5242,33 +5229,25 @@
                   <a:schemeClr val="tx1"/>
                 </a:solidFill>
               </a:rPr>
-              <a:t>DSLS: days since local spring. </a:t>
-            </a:r>
-            <a:r>
-              <a:rPr lang="en-US" sz="1600" u="sng" dirty="0" smtClean="0">
-                <a:solidFill>
-                  <a:schemeClr val="tx1"/>
-                </a:solidFill>
-              </a:rPr>
-              <a:t>(Julian date – day of first spring)</a:t>
-            </a:r>
+              <a:t>DSLS: days since local spring</a:t>
+            </a:r>
+          </a:p>
+          <a:p>
             <a:r>
               <a:rPr lang="en-US" sz="1600" dirty="0" smtClean="0">
                 <a:solidFill>
                   <a:schemeClr val="tx1"/>
                 </a:solidFill>
               </a:rPr>
-              <a:t>  									     365</a:t>
-            </a:r>
-          </a:p>
-          <a:p>
+              <a:t>DSLS2</a:t>
+            </a:r>
             <a:r>
               <a:rPr lang="en-US" sz="1600" dirty="0">
                 <a:solidFill>
                   <a:schemeClr val="tx1"/>
                 </a:solidFill>
               </a:rPr>
-              <a:t>DSLS2: </a:t>
+              <a:t>: </a:t>
             </a:r>
             <a:r>
               <a:rPr lang="en-US" sz="1600" dirty="0" smtClean="0">
@@ -5326,7 +5305,7 @@
                   <a:schemeClr val="tx1"/>
                 </a:solidFill>
               </a:rPr>
-              <a:t>LCC2OpenWet: Indicator variable - if habitat is open or wet (from LCC2)</a:t>
+              <a:t>LCC2OpenWet: Indicator variable - if habitat is open or wet</a:t>
             </a:r>
           </a:p>
           <a:p>
@@ -5336,7 +5315,7 @@
                   <a:schemeClr val="tx1"/>
                 </a:solidFill>
               </a:rPr>
-              <a:t>LCC4Conif: Indicator variable – if habitat is coniferous (from LCC4)</a:t>
+              <a:t>LCC4Conif: Indicator variable – if habitat is coniferous </a:t>
             </a:r>
           </a:p>
           <a:p>
@@ -5348,13 +5327,23 @@
               </a:rPr>
               <a:t>LCC4Open: Indicator variable – if habitat is open</a:t>
             </a:r>
+          </a:p>
+          <a:p>
+            <a:r>
+              <a:rPr lang="en-US" sz="1600" dirty="0" smtClean="0">
+                <a:solidFill>
+                  <a:schemeClr val="tx1"/>
+                </a:solidFill>
+              </a:rPr>
+              <a:t>LCC4Wet: Indicator variable – if habitat is wet</a:t>
+            </a:r>
             <a:r>
               <a:rPr lang="en-US" sz="1600" dirty="0">
                 <a:solidFill>
                   <a:schemeClr val="tx1"/>
                 </a:solidFill>
               </a:rPr>
-              <a:t> (from LCC4)</a:t>
+              <a:t> </a:t>
             </a:r>
             <a:endParaRPr lang="en-US" sz="1600" dirty="0" smtClean="0">
               <a:solidFill>
@@ -5369,728 +5358,7 @@
                   <a:schemeClr val="tx1"/>
                 </a:solidFill>
               </a:rPr>
-              <a:t>LCC4Wet: Indicator variable – if habitat is wet</a:t>
-            </a:r>
-            <a:r>
-              <a:rPr lang="en-US" sz="1600" dirty="0">
-                <a:solidFill>
-                  <a:schemeClr val="tx1"/>
-                </a:solidFill>
-              </a:rPr>
-              <a:t> (from LCC4)</a:t>
-            </a:r>
-            <a:endParaRPr lang="en-US" sz="1600" dirty="0" smtClean="0">
-              <a:solidFill>
-                <a:schemeClr val="tx1"/>
-              </a:solidFill>
-            </a:endParaRPr>
-          </a:p>
-          <a:p>
-            <a:r>
-              <a:rPr lang="en-US" sz="1600" dirty="0" smtClean="0">
-                <a:solidFill>
-                  <a:schemeClr val="tx1"/>
-                </a:solidFill>
-              </a:rPr>
               <a:t>MAXDIS: maximum distance band for point count, divided by 100</a:t>
-            </a:r>
-          </a:p>
-        </p:txBody>
-      </p:sp>
-      <p:sp>
-        <p:nvSpPr>
-          <p:cNvPr id="12" name="Rectangle 11"/>
-          <p:cNvSpPr/>
-          <p:nvPr/>
-        </p:nvSpPr>
-        <p:spPr>
-          <a:xfrm>
-            <a:off x="435768" y="1892346"/>
-            <a:ext cx="6300787" cy="2779668"/>
-          </a:xfrm>
-          <a:prstGeom prst="rect">
-            <a:avLst/>
-          </a:prstGeom>
-          <a:solidFill>
-            <a:schemeClr val="bg1"/>
-          </a:solidFill>
-          <a:ln>
-            <a:noFill/>
-          </a:ln>
-        </p:spPr>
-        <p:style>
-          <a:lnRef idx="2">
-            <a:schemeClr val="accent1">
-              <a:shade val="50000"/>
-            </a:schemeClr>
-          </a:lnRef>
-          <a:fillRef idx="1">
-            <a:schemeClr val="accent1"/>
-          </a:fillRef>
-          <a:effectRef idx="0">
-            <a:schemeClr val="accent1"/>
-          </a:effectRef>
-          <a:fontRef idx="minor">
-            <a:schemeClr val="lt1"/>
-          </a:fontRef>
-        </p:style>
-        <p:txBody>
-          <a:bodyPr rtlCol="0" anchor="t" anchorCtr="0"/>
-          <a:lstStyle/>
-          <a:p>
-            <a:pPr algn="ctr"/>
-            <a:r>
-              <a:rPr lang="en-US" b="1" dirty="0" smtClean="0">
-                <a:solidFill>
-                  <a:schemeClr val="tx1"/>
-                </a:solidFill>
-              </a:rPr>
-              <a:t>Fields needed to calculate offsets:</a:t>
-            </a:r>
-            <a:endParaRPr lang="en-US" b="1" dirty="0">
-              <a:solidFill>
-                <a:schemeClr val="tx1"/>
-              </a:solidFill>
-            </a:endParaRPr>
-          </a:p>
-          <a:p>
-            <a:r>
-              <a:rPr lang="en-US" sz="1600" dirty="0" smtClean="0">
-                <a:solidFill>
-                  <a:schemeClr val="tx1"/>
-                </a:solidFill>
-              </a:rPr>
-              <a:t>JULIAN: Julian day (extracted as </a:t>
-            </a:r>
-            <a:r>
-              <a:rPr lang="en-US" sz="1600" dirty="0" err="1" smtClean="0">
-                <a:solidFill>
-                  <a:schemeClr val="tx1"/>
-                </a:solidFill>
-              </a:rPr>
-              <a:t>yday</a:t>
-            </a:r>
-            <a:r>
-              <a:rPr lang="en-US" sz="1600" dirty="0" smtClean="0">
-                <a:solidFill>
-                  <a:schemeClr val="tx1"/>
-                </a:solidFill>
-              </a:rPr>
-              <a:t> from </a:t>
-            </a:r>
-            <a:r>
-              <a:rPr lang="en-US" sz="1600" smtClean="0">
-                <a:solidFill>
-                  <a:schemeClr val="tx1"/>
-                </a:solidFill>
-              </a:rPr>
-              <a:t>POSIXct</a:t>
-            </a:r>
-            <a:endParaRPr lang="en-US" sz="1600" dirty="0">
-              <a:solidFill>
-                <a:schemeClr val="tx1"/>
-              </a:solidFill>
-            </a:endParaRPr>
-          </a:p>
-          <a:p>
-            <a:r>
-              <a:rPr lang="en-US" sz="1600" dirty="0">
-                <a:solidFill>
-                  <a:schemeClr val="tx1"/>
-                </a:solidFill>
-              </a:rPr>
-              <a:t>JDAY2: </a:t>
-            </a:r>
-            <a:r>
-              <a:rPr lang="en-US" sz="1600" dirty="0" smtClean="0">
-                <a:solidFill>
-                  <a:schemeClr val="tx1"/>
-                </a:solidFill>
-              </a:rPr>
-              <a:t>JDAY</a:t>
-            </a:r>
-            <a:r>
-              <a:rPr lang="en-US" sz="1600" baseline="30000" dirty="0" smtClean="0">
-                <a:solidFill>
-                  <a:schemeClr val="tx1"/>
-                </a:solidFill>
-              </a:rPr>
-              <a:t>2</a:t>
-            </a:r>
-            <a:endParaRPr lang="en-US" sz="1600" baseline="30000" dirty="0">
-              <a:solidFill>
-                <a:schemeClr val="tx1"/>
-              </a:solidFill>
-            </a:endParaRPr>
-          </a:p>
-          <a:p>
-            <a:r>
-              <a:rPr lang="en-US" sz="1600" dirty="0" smtClean="0">
-                <a:solidFill>
-                  <a:schemeClr val="tx1"/>
-                </a:solidFill>
-              </a:rPr>
-              <a:t>TSSR: time since sunrise (requires time zone)</a:t>
-            </a:r>
-          </a:p>
-          <a:p>
-            <a:r>
-              <a:rPr lang="en-US" sz="1600" dirty="0">
-                <a:solidFill>
-                  <a:schemeClr val="tx1"/>
-                </a:solidFill>
-              </a:rPr>
-              <a:t>TSSR2: TSSR</a:t>
-            </a:r>
-            <a:r>
-              <a:rPr lang="en-US" sz="1600" baseline="30000" dirty="0">
-                <a:solidFill>
-                  <a:schemeClr val="tx1"/>
-                </a:solidFill>
-              </a:rPr>
-              <a:t>2</a:t>
-            </a:r>
-            <a:endParaRPr lang="en-US" sz="1600" dirty="0">
-              <a:solidFill>
-                <a:schemeClr val="tx1"/>
-              </a:solidFill>
-            </a:endParaRPr>
-          </a:p>
-          <a:p>
-            <a:r>
-              <a:rPr lang="en-US" sz="1600" dirty="0" smtClean="0">
-                <a:solidFill>
-                  <a:schemeClr val="tx1"/>
-                </a:solidFill>
-              </a:rPr>
-              <a:t>DSLS: days since local spring. </a:t>
-            </a:r>
-            <a:r>
-              <a:rPr lang="en-US" sz="1600" u="sng" dirty="0" smtClean="0">
-                <a:solidFill>
-                  <a:schemeClr val="tx1"/>
-                </a:solidFill>
-              </a:rPr>
-              <a:t>(Julian date – day of first spring)</a:t>
-            </a:r>
-            <a:r>
-              <a:rPr lang="en-US" sz="1600" dirty="0" smtClean="0">
-                <a:solidFill>
-                  <a:schemeClr val="tx1"/>
-                </a:solidFill>
-              </a:rPr>
-              <a:t>  									     365</a:t>
-            </a:r>
-          </a:p>
-          <a:p>
-            <a:r>
-              <a:rPr lang="en-US" sz="1600" dirty="0">
-                <a:solidFill>
-                  <a:schemeClr val="tx1"/>
-                </a:solidFill>
-              </a:rPr>
-              <a:t>DSLS2: </a:t>
-            </a:r>
-            <a:r>
-              <a:rPr lang="en-US" sz="1600" dirty="0" smtClean="0">
-                <a:solidFill>
-                  <a:schemeClr val="tx1"/>
-                </a:solidFill>
-              </a:rPr>
-              <a:t>DSLS</a:t>
-            </a:r>
-            <a:r>
-              <a:rPr lang="en-US" sz="1600" baseline="30000" dirty="0" smtClean="0">
-                <a:solidFill>
-                  <a:schemeClr val="tx1"/>
-                </a:solidFill>
-              </a:rPr>
-              <a:t>2</a:t>
-            </a:r>
-          </a:p>
-          <a:p>
-            <a:endParaRPr lang="en-US" sz="1600" b="1" dirty="0" smtClean="0">
-              <a:solidFill>
-                <a:schemeClr val="tx1"/>
-              </a:solidFill>
-            </a:endParaRPr>
-          </a:p>
-        </p:txBody>
-      </p:sp>
-    </p:spTree>
-    <p:extLst>
-      <p:ext uri="{BB962C8B-B14F-4D97-AF65-F5344CB8AC3E}">
-        <p14:creationId xmlns:p14="http://schemas.microsoft.com/office/powerpoint/2010/main" val="1724498266"/>
-      </p:ext>
-    </p:extLst>
-  </p:cSld>
-  <p:clrMapOvr>
-    <a:masterClrMapping/>
-  </p:clrMapOvr>
-</p:sld>
-</file>
-
-<file path=ppt/slides/slide4.xml><?xml version="1.0" encoding="utf-8"?>
-<p:sld xmlns:a="http://schemas.openxmlformats.org/drawingml/2006/main" xmlns:r="http://schemas.openxmlformats.org/officeDocument/2006/relationships" xmlns:p="http://schemas.openxmlformats.org/presentationml/2006/main">
-  <p:cSld>
-    <p:spTree>
-      <p:nvGrpSpPr>
-        <p:cNvPr id="1" name=""/>
-        <p:cNvGrpSpPr/>
-        <p:nvPr/>
-      </p:nvGrpSpPr>
-      <p:grpSpPr>
-        <a:xfrm>
-          <a:off x="0" y="0"/>
-          <a:ext cx="0" cy="0"/>
-          <a:chOff x="0" y="0"/>
-          <a:chExt cx="0" cy="0"/>
-        </a:xfrm>
-      </p:grpSpPr>
-      <p:sp>
-        <p:nvSpPr>
-          <p:cNvPr id="6" name="Rounded Rectangle 5"/>
-          <p:cNvSpPr/>
-          <p:nvPr/>
-        </p:nvSpPr>
-        <p:spPr>
-          <a:xfrm>
-            <a:off x="314325" y="1497840"/>
-            <a:ext cx="6543675" cy="5195853"/>
-          </a:xfrm>
-          <a:prstGeom prst="roundRect">
-            <a:avLst>
-              <a:gd name="adj" fmla="val 4206"/>
-            </a:avLst>
-          </a:prstGeom>
-        </p:spPr>
-        <p:style>
-          <a:lnRef idx="3">
-            <a:schemeClr val="lt1"/>
-          </a:lnRef>
-          <a:fillRef idx="1">
-            <a:schemeClr val="accent3"/>
-          </a:fillRef>
-          <a:effectRef idx="1">
-            <a:schemeClr val="accent3"/>
-          </a:effectRef>
-          <a:fontRef idx="minor">
-            <a:schemeClr val="lt1"/>
-          </a:fontRef>
-        </p:style>
-        <p:txBody>
-          <a:bodyPr rtlCol="0" anchor="t" anchorCtr="0"/>
-          <a:lstStyle/>
-          <a:p>
-            <a:pPr algn="ctr"/>
-            <a:r>
-              <a:rPr lang="en-US" dirty="0" smtClean="0">
-                <a:solidFill>
-                  <a:schemeClr val="tx1"/>
-                </a:solidFill>
-              </a:rPr>
-              <a:t>Necessary Input</a:t>
-            </a:r>
-            <a:endParaRPr lang="en-US" dirty="0">
-              <a:solidFill>
-                <a:schemeClr val="tx1"/>
-              </a:solidFill>
-            </a:endParaRPr>
-          </a:p>
-        </p:txBody>
-      </p:sp>
-      <p:sp>
-        <p:nvSpPr>
-          <p:cNvPr id="8" name="Rounded Rectangle 7"/>
-          <p:cNvSpPr/>
-          <p:nvPr/>
-        </p:nvSpPr>
-        <p:spPr>
-          <a:xfrm>
-            <a:off x="442913" y="7308092"/>
-            <a:ext cx="6543675" cy="3267835"/>
-          </a:xfrm>
-          <a:prstGeom prst="roundRect">
-            <a:avLst>
-              <a:gd name="adj" fmla="val 4206"/>
-            </a:avLst>
-          </a:prstGeom>
-        </p:spPr>
-        <p:style>
-          <a:lnRef idx="3">
-            <a:schemeClr val="lt1"/>
-          </a:lnRef>
-          <a:fillRef idx="1">
-            <a:schemeClr val="accent3"/>
-          </a:fillRef>
-          <a:effectRef idx="1">
-            <a:schemeClr val="accent3"/>
-          </a:effectRef>
-          <a:fontRef idx="minor">
-            <a:schemeClr val="lt1"/>
-          </a:fontRef>
-        </p:style>
-        <p:txBody>
-          <a:bodyPr rtlCol="0" anchor="t" anchorCtr="0"/>
-          <a:lstStyle/>
-          <a:p>
-            <a:pPr algn="ctr"/>
-            <a:r>
-              <a:rPr lang="en-US" dirty="0" smtClean="0">
-                <a:solidFill>
-                  <a:schemeClr val="tx1"/>
-                </a:solidFill>
-              </a:rPr>
-              <a:t>Fields Required in Output</a:t>
-            </a:r>
-            <a:endParaRPr lang="en-US" dirty="0">
-              <a:solidFill>
-                <a:schemeClr val="tx1"/>
-              </a:solidFill>
-            </a:endParaRPr>
-          </a:p>
-        </p:txBody>
-      </p:sp>
-      <p:sp>
-        <p:nvSpPr>
-          <p:cNvPr id="9" name="Rectangle 8"/>
-          <p:cNvSpPr/>
-          <p:nvPr/>
-        </p:nvSpPr>
-        <p:spPr>
-          <a:xfrm>
-            <a:off x="442913" y="1983143"/>
-            <a:ext cx="6300787" cy="4517670"/>
-          </a:xfrm>
-          <a:prstGeom prst="rect">
-            <a:avLst/>
-          </a:prstGeom>
-          <a:solidFill>
-            <a:schemeClr val="bg1"/>
-          </a:solidFill>
-          <a:ln>
-            <a:noFill/>
-          </a:ln>
-        </p:spPr>
-        <p:style>
-          <a:lnRef idx="2">
-            <a:schemeClr val="accent1">
-              <a:shade val="50000"/>
-            </a:schemeClr>
-          </a:lnRef>
-          <a:fillRef idx="1">
-            <a:schemeClr val="accent1"/>
-          </a:fillRef>
-          <a:effectRef idx="0">
-            <a:schemeClr val="accent1"/>
-          </a:effectRef>
-          <a:fontRef idx="minor">
-            <a:schemeClr val="lt1"/>
-          </a:fontRef>
-        </p:style>
-        <p:txBody>
-          <a:bodyPr rtlCol="0" anchor="t" anchorCtr="0"/>
-          <a:lstStyle/>
-          <a:p>
-            <a:pPr algn="ctr"/>
-            <a:r>
-              <a:rPr lang="en-US" b="1" dirty="0" smtClean="0">
-                <a:solidFill>
-                  <a:schemeClr val="tx1"/>
-                </a:solidFill>
-              </a:rPr>
-              <a:t>Fields needed to calculate offsets:</a:t>
-            </a:r>
-            <a:endParaRPr lang="en-US" b="1" dirty="0">
-              <a:solidFill>
-                <a:schemeClr val="tx1"/>
-              </a:solidFill>
-            </a:endParaRPr>
-          </a:p>
-          <a:p>
-            <a:r>
-              <a:rPr lang="en-US" sz="1600" b="1" dirty="0" smtClean="0">
-                <a:solidFill>
-                  <a:schemeClr val="tx1"/>
-                </a:solidFill>
-              </a:rPr>
-              <a:t>Singing rate (time removal) component</a:t>
-            </a:r>
-          </a:p>
-          <a:p>
-            <a:r>
-              <a:rPr lang="en-US" sz="1600" dirty="0" smtClean="0">
-                <a:solidFill>
-                  <a:schemeClr val="tx1"/>
-                </a:solidFill>
-              </a:rPr>
-              <a:t>JDAY</a:t>
-            </a:r>
-            <a:r>
-              <a:rPr lang="en-US" sz="1600" dirty="0">
-                <a:solidFill>
-                  <a:schemeClr val="tx1"/>
-                </a:solidFill>
-              </a:rPr>
-              <a:t>: Julian day / 365</a:t>
-            </a:r>
-          </a:p>
-          <a:p>
-            <a:r>
-              <a:rPr lang="en-US" sz="1600" dirty="0">
-                <a:solidFill>
-                  <a:schemeClr val="tx1"/>
-                </a:solidFill>
-              </a:rPr>
-              <a:t>JDAY2: JDAY</a:t>
-            </a:r>
-            <a:r>
-              <a:rPr lang="en-US" sz="1600" baseline="30000" dirty="0">
-                <a:solidFill>
-                  <a:schemeClr val="tx1"/>
-                </a:solidFill>
-              </a:rPr>
-              <a:t>2</a:t>
-            </a:r>
-          </a:p>
-          <a:p>
-            <a:r>
-              <a:rPr lang="en-US" sz="1600" dirty="0" smtClean="0">
-                <a:solidFill>
-                  <a:schemeClr val="tx1"/>
-                </a:solidFill>
-              </a:rPr>
-              <a:t>TSSR: time since sunrise </a:t>
-            </a:r>
-            <a:endParaRPr lang="en-US" sz="1600" dirty="0" smtClean="0">
-              <a:solidFill>
-                <a:schemeClr val="tx1"/>
-              </a:solidFill>
-            </a:endParaRPr>
-          </a:p>
-          <a:p>
-            <a:r>
-              <a:rPr lang="en-US" sz="1600" dirty="0" smtClean="0">
-                <a:solidFill>
-                  <a:schemeClr val="tx1"/>
-                </a:solidFill>
-              </a:rPr>
-              <a:t>TSSR2</a:t>
-            </a:r>
-            <a:r>
-              <a:rPr lang="en-US" sz="1600" dirty="0">
-                <a:solidFill>
-                  <a:schemeClr val="tx1"/>
-                </a:solidFill>
-              </a:rPr>
-              <a:t>: TSSR</a:t>
-            </a:r>
-            <a:r>
-              <a:rPr lang="en-US" sz="1600" baseline="30000" dirty="0">
-                <a:solidFill>
-                  <a:schemeClr val="tx1"/>
-                </a:solidFill>
-              </a:rPr>
-              <a:t>2</a:t>
-            </a:r>
-            <a:endParaRPr lang="en-US" sz="1600" dirty="0">
-              <a:solidFill>
-                <a:schemeClr val="tx1"/>
-              </a:solidFill>
-            </a:endParaRPr>
-          </a:p>
-          <a:p>
-            <a:r>
-              <a:rPr lang="en-US" sz="1600" dirty="0" smtClean="0">
-                <a:solidFill>
-                  <a:schemeClr val="tx1"/>
-                </a:solidFill>
-              </a:rPr>
-              <a:t>DSLS: days since local </a:t>
-            </a:r>
-            <a:r>
-              <a:rPr lang="en-US" sz="1600" dirty="0" smtClean="0">
-                <a:solidFill>
-                  <a:schemeClr val="tx1"/>
-                </a:solidFill>
-              </a:rPr>
-              <a:t>spring</a:t>
-            </a:r>
-          </a:p>
-          <a:p>
-            <a:r>
-              <a:rPr lang="en-US" sz="1600" dirty="0" smtClean="0">
-                <a:solidFill>
-                  <a:schemeClr val="tx1"/>
-                </a:solidFill>
-              </a:rPr>
-              <a:t>DSLS2</a:t>
-            </a:r>
-            <a:r>
-              <a:rPr lang="en-US" sz="1600" dirty="0">
-                <a:solidFill>
-                  <a:schemeClr val="tx1"/>
-                </a:solidFill>
-              </a:rPr>
-              <a:t>: </a:t>
-            </a:r>
-            <a:r>
-              <a:rPr lang="en-US" sz="1600" dirty="0" smtClean="0">
-                <a:solidFill>
-                  <a:schemeClr val="tx1"/>
-                </a:solidFill>
-              </a:rPr>
-              <a:t>DSLS</a:t>
-            </a:r>
-            <a:r>
-              <a:rPr lang="en-US" sz="1600" baseline="30000" dirty="0" smtClean="0">
-                <a:solidFill>
-                  <a:schemeClr val="tx1"/>
-                </a:solidFill>
-              </a:rPr>
-              <a:t>2</a:t>
-            </a:r>
-          </a:p>
-          <a:p>
-            <a:endParaRPr lang="en-US" sz="1600" b="1" dirty="0" smtClean="0">
-              <a:solidFill>
-                <a:schemeClr val="tx1"/>
-              </a:solidFill>
-            </a:endParaRPr>
-          </a:p>
-          <a:p>
-            <a:r>
-              <a:rPr lang="en-US" sz="1600" b="1" dirty="0" smtClean="0">
-                <a:solidFill>
-                  <a:schemeClr val="tx1"/>
-                </a:solidFill>
-              </a:rPr>
-              <a:t>Effective Detection Radius (distance sampling) component</a:t>
-            </a:r>
-            <a:endParaRPr lang="en-US" sz="1600" b="1" dirty="0">
-              <a:solidFill>
-                <a:schemeClr val="tx1"/>
-              </a:solidFill>
-            </a:endParaRPr>
-          </a:p>
-          <a:p>
-            <a:r>
-              <a:rPr lang="en-US" sz="1600" dirty="0" smtClean="0">
-                <a:solidFill>
-                  <a:schemeClr val="tx1"/>
-                </a:solidFill>
-              </a:rPr>
-              <a:t>TREE: percent tree cover</a:t>
-            </a:r>
-          </a:p>
-          <a:p>
-            <a:r>
-              <a:rPr lang="en-US" sz="1600" dirty="0" smtClean="0">
-                <a:solidFill>
-                  <a:schemeClr val="tx1"/>
-                </a:solidFill>
-              </a:rPr>
-              <a:t>LCC2OpenWet: Indicator variable - if habitat is open or </a:t>
-            </a:r>
-            <a:r>
-              <a:rPr lang="en-US" sz="1600" dirty="0" smtClean="0">
-                <a:solidFill>
-                  <a:schemeClr val="tx1"/>
-                </a:solidFill>
-              </a:rPr>
-              <a:t>wet</a:t>
-            </a:r>
-            <a:endParaRPr lang="en-US" sz="1600" dirty="0" smtClean="0">
-              <a:solidFill>
-                <a:schemeClr val="tx1"/>
-              </a:solidFill>
-            </a:endParaRPr>
-          </a:p>
-          <a:p>
-            <a:r>
-              <a:rPr lang="en-US" sz="1600" dirty="0" smtClean="0">
-                <a:solidFill>
-                  <a:schemeClr val="tx1"/>
-                </a:solidFill>
-              </a:rPr>
-              <a:t>LCC4Conif: Indicator variable – if habitat is coniferous </a:t>
-            </a:r>
-            <a:endParaRPr lang="en-US" sz="1600" dirty="0" smtClean="0">
-              <a:solidFill>
-                <a:schemeClr val="tx1"/>
-              </a:solidFill>
-            </a:endParaRPr>
-          </a:p>
-          <a:p>
-            <a:r>
-              <a:rPr lang="en-US" sz="1600" dirty="0" smtClean="0">
-                <a:solidFill>
-                  <a:schemeClr val="tx1"/>
-                </a:solidFill>
-              </a:rPr>
-              <a:t>LCC4Open</a:t>
-            </a:r>
-            <a:r>
-              <a:rPr lang="en-US" sz="1600" dirty="0" smtClean="0">
-                <a:solidFill>
-                  <a:schemeClr val="tx1"/>
-                </a:solidFill>
-              </a:rPr>
-              <a:t>: Indicator variable – if habitat is </a:t>
-            </a:r>
-            <a:r>
-              <a:rPr lang="en-US" sz="1600" dirty="0" smtClean="0">
-                <a:solidFill>
-                  <a:schemeClr val="tx1"/>
-                </a:solidFill>
-              </a:rPr>
-              <a:t>open</a:t>
-            </a:r>
-            <a:endParaRPr lang="en-US" sz="1600" dirty="0" smtClean="0">
-              <a:solidFill>
-                <a:schemeClr val="tx1"/>
-              </a:solidFill>
-            </a:endParaRPr>
-          </a:p>
-          <a:p>
-            <a:r>
-              <a:rPr lang="en-US" sz="1600" dirty="0" smtClean="0">
-                <a:solidFill>
-                  <a:schemeClr val="tx1"/>
-                </a:solidFill>
-              </a:rPr>
-              <a:t>LCC4Wet: Indicator variable – if habitat is wet</a:t>
-            </a:r>
-            <a:r>
-              <a:rPr lang="en-US" sz="1600" dirty="0">
-                <a:solidFill>
-                  <a:schemeClr val="tx1"/>
-                </a:solidFill>
-              </a:rPr>
-              <a:t> </a:t>
-            </a:r>
-            <a:endParaRPr lang="en-US" sz="1600" dirty="0" smtClean="0">
-              <a:solidFill>
-                <a:schemeClr val="tx1"/>
-              </a:solidFill>
-            </a:endParaRPr>
-          </a:p>
-          <a:p>
-            <a:r>
-              <a:rPr lang="en-US" sz="1600" dirty="0" smtClean="0">
-                <a:solidFill>
-                  <a:schemeClr val="tx1"/>
-                </a:solidFill>
-              </a:rPr>
-              <a:t>MAXDIS</a:t>
-            </a:r>
-            <a:r>
-              <a:rPr lang="en-US" sz="1600" dirty="0" smtClean="0">
-                <a:solidFill>
-                  <a:schemeClr val="tx1"/>
-                </a:solidFill>
-              </a:rPr>
-              <a:t>: maximum distance band for point count, divided by 100</a:t>
             </a:r>
           </a:p>
         </p:txBody>

</xml_diff>